<commit_message>
Day 2 slides: events, streams, process
</commit_message>
<xml_diff>
--- a/slides/Node Slides Day 2.pptx
+++ b/slides/Node Slides Day 2.pptx
@@ -13,6 +13,21 @@
     <p:sldId id="299" r:id="rId7"/>
     <p:sldId id="300" r:id="rId8"/>
     <p:sldId id="301" r:id="rId9"/>
+    <p:sldId id="302" r:id="rId10"/>
+    <p:sldId id="303" r:id="rId11"/>
+    <p:sldId id="313" r:id="rId12"/>
+    <p:sldId id="314" r:id="rId13"/>
+    <p:sldId id="315" r:id="rId14"/>
+    <p:sldId id="316" r:id="rId15"/>
+    <p:sldId id="312" r:id="rId16"/>
+    <p:sldId id="304" r:id="rId17"/>
+    <p:sldId id="305" r:id="rId18"/>
+    <p:sldId id="306" r:id="rId19"/>
+    <p:sldId id="309" r:id="rId20"/>
+    <p:sldId id="307" r:id="rId21"/>
+    <p:sldId id="308" r:id="rId22"/>
+    <p:sldId id="310" r:id="rId23"/>
+    <p:sldId id="311" r:id="rId24"/>
   </p:sldIdLst>
   <p:sldSz cx="9144000" cy="6858000" type="screen4x3"/>
   <p:notesSz cx="6858000" cy="9144000"/>
@@ -3208,6 +3223,1594 @@
 </p:sld>
 </file>
 
+<file path=ppt/slides/slide10.xml><?xml version="1.0" encoding="utf-8"?>
+<p:sld xmlns:a="http://schemas.openxmlformats.org/drawingml/2006/main" xmlns:r="http://schemas.openxmlformats.org/officeDocument/2006/relationships" xmlns:p="http://schemas.openxmlformats.org/presentationml/2006/main">
+  <p:cSld>
+    <p:spTree>
+      <p:nvGrpSpPr>
+        <p:cNvPr id="1" name=""/>
+        <p:cNvGrpSpPr/>
+        <p:nvPr/>
+      </p:nvGrpSpPr>
+      <p:grpSpPr>
+        <a:xfrm>
+          <a:off x="0" y="0"/>
+          <a:ext cx="0" cy="0"/>
+          <a:chOff x="0" y="0"/>
+          <a:chExt cx="0" cy="0"/>
+        </a:xfrm>
+      </p:grpSpPr>
+      <p:sp>
+        <p:nvSpPr>
+          <p:cNvPr id="2" name="Title 1"/>
+          <p:cNvSpPr>
+            <a:spLocks noGrp="1"/>
+          </p:cNvSpPr>
+          <p:nvPr>
+            <p:ph type="ctrTitle"/>
+          </p:nvPr>
+        </p:nvSpPr>
+        <p:spPr>
+          <a:xfrm>
+            <a:off x="685800" y="160685"/>
+            <a:ext cx="7772400" cy="1470025"/>
+          </a:xfrm>
+        </p:spPr>
+        <p:txBody>
+          <a:bodyPr/>
+          <a:lstStyle/>
+          <a:p>
+            <a:pPr marL="457200" indent="-457200"/>
+            <a:r>
+              <a:rPr lang="en-US" dirty="0" err="1" smtClean="0"/>
+              <a:t>Node.js</a:t>
+            </a:r>
+            <a:r>
+              <a:rPr lang="en-US" dirty="0" smtClean="0"/>
+              <a:t> Streams</a:t>
+            </a:r>
+            <a:endParaRPr lang="en-US" dirty="0"/>
+          </a:p>
+        </p:txBody>
+      </p:sp>
+      <p:sp>
+        <p:nvSpPr>
+          <p:cNvPr id="3" name="Subtitle 2"/>
+          <p:cNvSpPr>
+            <a:spLocks noGrp="1"/>
+          </p:cNvSpPr>
+          <p:nvPr>
+            <p:ph type="subTitle" idx="1"/>
+          </p:nvPr>
+        </p:nvSpPr>
+        <p:spPr>
+          <a:xfrm>
+            <a:off x="1371600" y="1630710"/>
+            <a:ext cx="6400800" cy="4609893"/>
+          </a:xfrm>
+        </p:spPr>
+        <p:txBody>
+          <a:bodyPr>
+            <a:normAutofit/>
+          </a:bodyPr>
+          <a:lstStyle/>
+          <a:p>
+            <a:pPr marL="457200" indent="-457200" algn="l">
+              <a:buFont typeface="Arial"/>
+              <a:buChar char="•"/>
+            </a:pPr>
+            <a:r>
+              <a:rPr lang="en-US" dirty="0" smtClean="0"/>
+              <a:t>API for streaming data</a:t>
+            </a:r>
+          </a:p>
+          <a:p>
+            <a:pPr marL="457200" indent="-457200" algn="l">
+              <a:buFont typeface="Arial"/>
+              <a:buChar char="•"/>
+            </a:pPr>
+            <a:r>
+              <a:rPr lang="en-US" dirty="0" err="1" smtClean="0"/>
+              <a:t>EventEmitters</a:t>
+            </a:r>
+            <a:endParaRPr lang="en-US" dirty="0" smtClean="0"/>
+          </a:p>
+          <a:p>
+            <a:pPr marL="457200" indent="-457200" algn="l">
+              <a:buFont typeface="Arial"/>
+              <a:buChar char="•"/>
+            </a:pPr>
+            <a:r>
+              <a:rPr lang="en-US" dirty="0" smtClean="0"/>
+              <a:t>Used a lot in </a:t>
+            </a:r>
+            <a:r>
+              <a:rPr lang="en-US" dirty="0" err="1" smtClean="0"/>
+              <a:t>Node.js</a:t>
+            </a:r>
+            <a:endParaRPr lang="en-US" dirty="0" smtClean="0"/>
+          </a:p>
+          <a:p>
+            <a:pPr marL="914400" lvl="1" indent="-457200" algn="l">
+              <a:buFont typeface="Arial"/>
+              <a:buChar char="•"/>
+            </a:pPr>
+            <a:r>
+              <a:rPr lang="en-US" dirty="0" smtClean="0"/>
+              <a:t>HTTP request &amp; response</a:t>
+            </a:r>
+          </a:p>
+          <a:p>
+            <a:pPr marL="914400" lvl="1" indent="-457200" algn="l">
+              <a:buFont typeface="Arial"/>
+              <a:buChar char="•"/>
+            </a:pPr>
+            <a:r>
+              <a:rPr lang="en-US" dirty="0" err="1" smtClean="0"/>
+              <a:t>Filesystem</a:t>
+            </a:r>
+            <a:r>
+              <a:rPr lang="en-US" dirty="0" smtClean="0"/>
+              <a:t> access</a:t>
+            </a:r>
+          </a:p>
+          <a:p>
+            <a:pPr marL="914400" lvl="1" indent="-457200" algn="l">
+              <a:buFont typeface="Arial"/>
+              <a:buChar char="•"/>
+            </a:pPr>
+            <a:r>
+              <a:rPr lang="en-US" dirty="0" err="1" smtClean="0"/>
+              <a:t>stdin</a:t>
+            </a:r>
+            <a:r>
+              <a:rPr lang="en-US" dirty="0" smtClean="0"/>
+              <a:t>, </a:t>
+            </a:r>
+            <a:r>
+              <a:rPr lang="en-US" dirty="0" err="1" smtClean="0"/>
+              <a:t>stdout</a:t>
+            </a:r>
+            <a:r>
+              <a:rPr lang="en-US" dirty="0" smtClean="0"/>
+              <a:t>, </a:t>
+            </a:r>
+            <a:r>
+              <a:rPr lang="en-US" dirty="0" err="1" smtClean="0"/>
+              <a:t>stderr</a:t>
+            </a:r>
+            <a:endParaRPr lang="en-US" dirty="0"/>
+          </a:p>
+        </p:txBody>
+      </p:sp>
+    </p:spTree>
+    <p:extLst>
+      <p:ext uri="{BB962C8B-B14F-4D97-AF65-F5344CB8AC3E}">
+        <p14:creationId xmlns:p14="http://schemas.microsoft.com/office/powerpoint/2010/main" val="4040659784"/>
+      </p:ext>
+    </p:extLst>
+  </p:cSld>
+  <p:clrMapOvr>
+    <a:masterClrMapping/>
+  </p:clrMapOvr>
+</p:sld>
+</file>
+
+<file path=ppt/slides/slide11.xml><?xml version="1.0" encoding="utf-8"?>
+<p:sld xmlns:a="http://schemas.openxmlformats.org/drawingml/2006/main" xmlns:r="http://schemas.openxmlformats.org/officeDocument/2006/relationships" xmlns:p="http://schemas.openxmlformats.org/presentationml/2006/main">
+  <p:cSld>
+    <p:spTree>
+      <p:nvGrpSpPr>
+        <p:cNvPr id="1" name=""/>
+        <p:cNvGrpSpPr/>
+        <p:nvPr/>
+      </p:nvGrpSpPr>
+      <p:grpSpPr>
+        <a:xfrm>
+          <a:off x="0" y="0"/>
+          <a:ext cx="0" cy="0"/>
+          <a:chOff x="0" y="0"/>
+          <a:chExt cx="0" cy="0"/>
+        </a:xfrm>
+      </p:grpSpPr>
+      <p:sp>
+        <p:nvSpPr>
+          <p:cNvPr id="2" name="Title 1"/>
+          <p:cNvSpPr>
+            <a:spLocks noGrp="1"/>
+          </p:cNvSpPr>
+          <p:nvPr>
+            <p:ph type="ctrTitle"/>
+          </p:nvPr>
+        </p:nvSpPr>
+        <p:spPr>
+          <a:xfrm>
+            <a:off x="685800" y="160685"/>
+            <a:ext cx="7772400" cy="1470025"/>
+          </a:xfrm>
+        </p:spPr>
+        <p:txBody>
+          <a:bodyPr/>
+          <a:lstStyle/>
+          <a:p>
+            <a:pPr marL="457200" indent="-457200"/>
+            <a:r>
+              <a:rPr lang="en-US" dirty="0" err="1" smtClean="0"/>
+              <a:t>Node.js</a:t>
+            </a:r>
+            <a:r>
+              <a:rPr lang="en-US" dirty="0" smtClean="0"/>
+              <a:t> Streams</a:t>
+            </a:r>
+            <a:endParaRPr lang="en-US" dirty="0"/>
+          </a:p>
+        </p:txBody>
+      </p:sp>
+      <p:sp>
+        <p:nvSpPr>
+          <p:cNvPr id="3" name="Subtitle 2"/>
+          <p:cNvSpPr>
+            <a:spLocks noGrp="1"/>
+          </p:cNvSpPr>
+          <p:nvPr>
+            <p:ph type="subTitle" idx="1"/>
+          </p:nvPr>
+        </p:nvSpPr>
+        <p:spPr>
+          <a:xfrm>
+            <a:off x="1371600" y="1630710"/>
+            <a:ext cx="6400800" cy="4609893"/>
+          </a:xfrm>
+        </p:spPr>
+        <p:txBody>
+          <a:bodyPr>
+            <a:normAutofit/>
+          </a:bodyPr>
+          <a:lstStyle/>
+          <a:p>
+            <a:pPr algn="l"/>
+            <a:r>
+              <a:rPr lang="en-US" dirty="0" smtClean="0"/>
+              <a:t>Readable</a:t>
+            </a:r>
+          </a:p>
+          <a:p>
+            <a:pPr marL="457200" indent="-457200" algn="l">
+              <a:buFont typeface="Arial"/>
+              <a:buChar char="•"/>
+            </a:pPr>
+            <a:r>
+              <a:rPr lang="en-US" dirty="0" smtClean="0"/>
+              <a:t>Buffers incoming data</a:t>
+            </a:r>
+          </a:p>
+          <a:p>
+            <a:pPr marL="457200" indent="-457200" algn="l">
+              <a:buFont typeface="Arial"/>
+              <a:buChar char="•"/>
+            </a:pPr>
+            <a:r>
+              <a:rPr lang="en-US" dirty="0" smtClean="0"/>
+              <a:t>Emits 'data' events as buffer fills</a:t>
+            </a:r>
+          </a:p>
+          <a:p>
+            <a:pPr marL="457200" indent="-457200" algn="l">
+              <a:buFont typeface="Arial"/>
+              <a:buChar char="•"/>
+            </a:pPr>
+            <a:r>
+              <a:rPr lang="en-US" dirty="0" smtClean="0"/>
+              <a:t>Do something with data in callback</a:t>
+            </a:r>
+          </a:p>
+          <a:p>
+            <a:pPr marL="457200" indent="-457200" algn="l">
+              <a:buFont typeface="Arial"/>
+              <a:buChar char="•"/>
+            </a:pPr>
+            <a:r>
+              <a:rPr lang="en-US" dirty="0" smtClean="0"/>
+              <a:t>If buffer fills, I/O events postpone</a:t>
+            </a:r>
+          </a:p>
+          <a:p>
+            <a:pPr marL="457200" indent="-457200" algn="l">
+              <a:buFont typeface="Arial"/>
+              <a:buChar char="•"/>
+            </a:pPr>
+            <a:r>
+              <a:rPr lang="en-US" dirty="0" smtClean="0"/>
+              <a:t>(data is never lost)</a:t>
+            </a:r>
+          </a:p>
+          <a:p>
+            <a:pPr marL="457200" indent="-457200" algn="l">
+              <a:buFont typeface="Arial"/>
+              <a:buChar char="•"/>
+            </a:pPr>
+            <a:r>
+              <a:rPr lang="en-US" dirty="0" smtClean="0"/>
+              <a:t>.pipe( writeable ) for convenience</a:t>
+            </a:r>
+          </a:p>
+          <a:p>
+            <a:pPr marL="457200" indent="-457200" algn="l">
+              <a:buFont typeface="Arial"/>
+              <a:buChar char="•"/>
+            </a:pPr>
+            <a:endParaRPr lang="en-US" dirty="0"/>
+          </a:p>
+        </p:txBody>
+      </p:sp>
+    </p:spTree>
+    <p:extLst>
+      <p:ext uri="{BB962C8B-B14F-4D97-AF65-F5344CB8AC3E}">
+        <p14:creationId xmlns:p14="http://schemas.microsoft.com/office/powerpoint/2010/main" val="3722900186"/>
+      </p:ext>
+    </p:extLst>
+  </p:cSld>
+  <p:clrMapOvr>
+    <a:masterClrMapping/>
+  </p:clrMapOvr>
+</p:sld>
+</file>
+
+<file path=ppt/slides/slide12.xml><?xml version="1.0" encoding="utf-8"?>
+<p:sld xmlns:a="http://schemas.openxmlformats.org/drawingml/2006/main" xmlns:r="http://schemas.openxmlformats.org/officeDocument/2006/relationships" xmlns:p="http://schemas.openxmlformats.org/presentationml/2006/main">
+  <p:cSld>
+    <p:spTree>
+      <p:nvGrpSpPr>
+        <p:cNvPr id="1" name=""/>
+        <p:cNvGrpSpPr/>
+        <p:nvPr/>
+      </p:nvGrpSpPr>
+      <p:grpSpPr>
+        <a:xfrm>
+          <a:off x="0" y="0"/>
+          <a:ext cx="0" cy="0"/>
+          <a:chOff x="0" y="0"/>
+          <a:chExt cx="0" cy="0"/>
+        </a:xfrm>
+      </p:grpSpPr>
+      <p:sp>
+        <p:nvSpPr>
+          <p:cNvPr id="2" name="Title 1"/>
+          <p:cNvSpPr>
+            <a:spLocks noGrp="1"/>
+          </p:cNvSpPr>
+          <p:nvPr>
+            <p:ph type="ctrTitle"/>
+          </p:nvPr>
+        </p:nvSpPr>
+        <p:spPr>
+          <a:xfrm>
+            <a:off x="685800" y="160685"/>
+            <a:ext cx="7772400" cy="1470025"/>
+          </a:xfrm>
+        </p:spPr>
+        <p:txBody>
+          <a:bodyPr/>
+          <a:lstStyle/>
+          <a:p>
+            <a:pPr marL="457200" indent="-457200"/>
+            <a:r>
+              <a:rPr lang="en-US" dirty="0" err="1" smtClean="0"/>
+              <a:t>Node.js</a:t>
+            </a:r>
+            <a:r>
+              <a:rPr lang="en-US" dirty="0" smtClean="0"/>
+              <a:t> Streams</a:t>
+            </a:r>
+            <a:endParaRPr lang="en-US" dirty="0"/>
+          </a:p>
+        </p:txBody>
+      </p:sp>
+      <p:sp>
+        <p:nvSpPr>
+          <p:cNvPr id="3" name="Subtitle 2"/>
+          <p:cNvSpPr>
+            <a:spLocks noGrp="1"/>
+          </p:cNvSpPr>
+          <p:nvPr>
+            <p:ph type="subTitle" idx="1"/>
+          </p:nvPr>
+        </p:nvSpPr>
+        <p:spPr>
+          <a:xfrm>
+            <a:off x="1371600" y="1630710"/>
+            <a:ext cx="6400800" cy="4609893"/>
+          </a:xfrm>
+        </p:spPr>
+        <p:txBody>
+          <a:bodyPr>
+            <a:normAutofit fontScale="92500"/>
+          </a:bodyPr>
+          <a:lstStyle/>
+          <a:p>
+            <a:pPr algn="l"/>
+            <a:r>
+              <a:rPr lang="en-US" dirty="0" smtClean="0"/>
+              <a:t>Writeable</a:t>
+            </a:r>
+          </a:p>
+          <a:p>
+            <a:pPr marL="457200" indent="-457200" algn="l">
+              <a:buFont typeface="Arial"/>
+              <a:buChar char="•"/>
+            </a:pPr>
+            <a:r>
+              <a:rPr lang="en-US" dirty="0" smtClean="0"/>
+              <a:t>Call .write( </a:t>
+            </a:r>
+            <a:r>
+              <a:rPr lang="en-US" dirty="0" err="1" smtClean="0"/>
+              <a:t>yourData</a:t>
+            </a:r>
+            <a:r>
+              <a:rPr lang="en-US" dirty="0" smtClean="0"/>
+              <a:t> )</a:t>
+            </a:r>
+          </a:p>
+          <a:p>
+            <a:pPr marL="457200" indent="-457200" algn="l">
+              <a:buFont typeface="Arial"/>
+              <a:buChar char="•"/>
+            </a:pPr>
+            <a:r>
+              <a:rPr lang="en-US" dirty="0" smtClean="0"/>
+              <a:t>Returns true if buffer free</a:t>
+            </a:r>
+          </a:p>
+          <a:p>
+            <a:pPr marL="457200" indent="-457200" algn="l">
+              <a:buFont typeface="Arial"/>
+              <a:buChar char="•"/>
+            </a:pPr>
+            <a:r>
+              <a:rPr lang="en-US" dirty="0" smtClean="0"/>
+              <a:t>If false, you need to handle </a:t>
+            </a:r>
+          </a:p>
+          <a:p>
+            <a:pPr marL="457200" indent="-457200" algn="l">
+              <a:buFont typeface="Arial"/>
+              <a:buChar char="•"/>
+            </a:pPr>
+            <a:r>
+              <a:rPr lang="en-US" dirty="0" smtClean="0"/>
+              <a:t>Wait for 'drain' event</a:t>
+            </a:r>
+          </a:p>
+          <a:p>
+            <a:pPr marL="457200" indent="-457200" algn="l">
+              <a:buFont typeface="Arial"/>
+              <a:buChar char="•"/>
+            </a:pPr>
+            <a:r>
+              <a:rPr lang="en-US" dirty="0" smtClean="0"/>
+              <a:t>Can still write while buffer != free</a:t>
+            </a:r>
+          </a:p>
+          <a:p>
+            <a:pPr marL="457200" indent="-457200" algn="l">
+              <a:buFont typeface="Arial"/>
+              <a:buChar char="•"/>
+            </a:pPr>
+            <a:r>
+              <a:rPr lang="en-US" dirty="0" smtClean="0"/>
+              <a:t>But increases memory – may crash</a:t>
+            </a:r>
+          </a:p>
+          <a:p>
+            <a:pPr marL="457200" indent="-457200" algn="l">
+              <a:buFont typeface="Arial"/>
+              <a:buChar char="•"/>
+            </a:pPr>
+            <a:r>
+              <a:rPr lang="en-US" dirty="0" smtClean="0"/>
+              <a:t>'pipe' event when readable attaches</a:t>
+            </a:r>
+          </a:p>
+          <a:p>
+            <a:pPr marL="457200" indent="-457200" algn="l">
+              <a:buFont typeface="Arial"/>
+              <a:buChar char="•"/>
+            </a:pPr>
+            <a:endParaRPr lang="en-US" dirty="0"/>
+          </a:p>
+        </p:txBody>
+      </p:sp>
+    </p:spTree>
+    <p:extLst>
+      <p:ext uri="{BB962C8B-B14F-4D97-AF65-F5344CB8AC3E}">
+        <p14:creationId xmlns:p14="http://schemas.microsoft.com/office/powerpoint/2010/main" val="269764233"/>
+      </p:ext>
+    </p:extLst>
+  </p:cSld>
+  <p:clrMapOvr>
+    <a:masterClrMapping/>
+  </p:clrMapOvr>
+</p:sld>
+</file>
+
+<file path=ppt/slides/slide13.xml><?xml version="1.0" encoding="utf-8"?>
+<p:sld xmlns:a="http://schemas.openxmlformats.org/drawingml/2006/main" xmlns:r="http://schemas.openxmlformats.org/officeDocument/2006/relationships" xmlns:p="http://schemas.openxmlformats.org/presentationml/2006/main">
+  <p:cSld>
+    <p:spTree>
+      <p:nvGrpSpPr>
+        <p:cNvPr id="1" name=""/>
+        <p:cNvGrpSpPr/>
+        <p:nvPr/>
+      </p:nvGrpSpPr>
+      <p:grpSpPr>
+        <a:xfrm>
+          <a:off x="0" y="0"/>
+          <a:ext cx="0" cy="0"/>
+          <a:chOff x="0" y="0"/>
+          <a:chExt cx="0" cy="0"/>
+        </a:xfrm>
+      </p:grpSpPr>
+      <p:sp>
+        <p:nvSpPr>
+          <p:cNvPr id="2" name="Title 1"/>
+          <p:cNvSpPr>
+            <a:spLocks noGrp="1"/>
+          </p:cNvSpPr>
+          <p:nvPr>
+            <p:ph type="ctrTitle"/>
+          </p:nvPr>
+        </p:nvSpPr>
+        <p:spPr>
+          <a:xfrm>
+            <a:off x="685800" y="160685"/>
+            <a:ext cx="7772400" cy="1470025"/>
+          </a:xfrm>
+        </p:spPr>
+        <p:txBody>
+          <a:bodyPr/>
+          <a:lstStyle/>
+          <a:p>
+            <a:pPr marL="457200" indent="-457200"/>
+            <a:r>
+              <a:rPr lang="en-US" dirty="0" err="1" smtClean="0"/>
+              <a:t>Node.js</a:t>
+            </a:r>
+            <a:r>
+              <a:rPr lang="en-US" dirty="0" smtClean="0"/>
+              <a:t> Streams</a:t>
+            </a:r>
+            <a:endParaRPr lang="en-US" dirty="0"/>
+          </a:p>
+        </p:txBody>
+      </p:sp>
+      <p:sp>
+        <p:nvSpPr>
+          <p:cNvPr id="3" name="Subtitle 2"/>
+          <p:cNvSpPr>
+            <a:spLocks noGrp="1"/>
+          </p:cNvSpPr>
+          <p:nvPr>
+            <p:ph type="subTitle" idx="1"/>
+          </p:nvPr>
+        </p:nvSpPr>
+        <p:spPr>
+          <a:xfrm>
+            <a:off x="1371600" y="1630710"/>
+            <a:ext cx="6400800" cy="4609893"/>
+          </a:xfrm>
+        </p:spPr>
+        <p:txBody>
+          <a:bodyPr>
+            <a:normAutofit/>
+          </a:bodyPr>
+          <a:lstStyle/>
+          <a:p>
+            <a:pPr algn="l"/>
+            <a:r>
+              <a:rPr lang="en-US" dirty="0" smtClean="0"/>
+              <a:t>Duplex</a:t>
+            </a:r>
+          </a:p>
+          <a:p>
+            <a:pPr marL="457200" indent="-457200" algn="l">
+              <a:buFont typeface="Arial"/>
+              <a:buChar char="•"/>
+            </a:pPr>
+            <a:r>
+              <a:rPr lang="en-US" dirty="0" smtClean="0"/>
+              <a:t>Inherits from Readable</a:t>
+            </a:r>
+          </a:p>
+          <a:p>
+            <a:pPr marL="457200" indent="-457200" algn="l">
+              <a:buFont typeface="Arial"/>
+              <a:buChar char="•"/>
+            </a:pPr>
+            <a:r>
+              <a:rPr lang="en-US" dirty="0" smtClean="0"/>
+              <a:t>Decorated with Writeable</a:t>
+            </a:r>
+            <a:endParaRPr lang="en-US" dirty="0"/>
+          </a:p>
+        </p:txBody>
+      </p:sp>
+    </p:spTree>
+    <p:extLst>
+      <p:ext uri="{BB962C8B-B14F-4D97-AF65-F5344CB8AC3E}">
+        <p14:creationId xmlns:p14="http://schemas.microsoft.com/office/powerpoint/2010/main" val="1353943233"/>
+      </p:ext>
+    </p:extLst>
+  </p:cSld>
+  <p:clrMapOvr>
+    <a:masterClrMapping/>
+  </p:clrMapOvr>
+</p:sld>
+</file>
+
+<file path=ppt/slides/slide14.xml><?xml version="1.0" encoding="utf-8"?>
+<p:sld xmlns:a="http://schemas.openxmlformats.org/drawingml/2006/main" xmlns:r="http://schemas.openxmlformats.org/officeDocument/2006/relationships" xmlns:p="http://schemas.openxmlformats.org/presentationml/2006/main">
+  <p:cSld>
+    <p:spTree>
+      <p:nvGrpSpPr>
+        <p:cNvPr id="1" name=""/>
+        <p:cNvGrpSpPr/>
+        <p:nvPr/>
+      </p:nvGrpSpPr>
+      <p:grpSpPr>
+        <a:xfrm>
+          <a:off x="0" y="0"/>
+          <a:ext cx="0" cy="0"/>
+          <a:chOff x="0" y="0"/>
+          <a:chExt cx="0" cy="0"/>
+        </a:xfrm>
+      </p:grpSpPr>
+      <p:sp>
+        <p:nvSpPr>
+          <p:cNvPr id="2" name="Title 1"/>
+          <p:cNvSpPr>
+            <a:spLocks noGrp="1"/>
+          </p:cNvSpPr>
+          <p:nvPr>
+            <p:ph type="ctrTitle"/>
+          </p:nvPr>
+        </p:nvSpPr>
+        <p:spPr>
+          <a:xfrm>
+            <a:off x="685800" y="160685"/>
+            <a:ext cx="7772400" cy="1470025"/>
+          </a:xfrm>
+        </p:spPr>
+        <p:txBody>
+          <a:bodyPr/>
+          <a:lstStyle/>
+          <a:p>
+            <a:pPr marL="457200" indent="-457200"/>
+            <a:r>
+              <a:rPr lang="en-US" dirty="0" err="1" smtClean="0"/>
+              <a:t>Node.js</a:t>
+            </a:r>
+            <a:r>
+              <a:rPr lang="en-US" dirty="0" smtClean="0"/>
+              <a:t> Streams</a:t>
+            </a:r>
+            <a:endParaRPr lang="en-US" dirty="0"/>
+          </a:p>
+        </p:txBody>
+      </p:sp>
+      <p:sp>
+        <p:nvSpPr>
+          <p:cNvPr id="3" name="Subtitle 2"/>
+          <p:cNvSpPr>
+            <a:spLocks noGrp="1"/>
+          </p:cNvSpPr>
+          <p:nvPr>
+            <p:ph type="subTitle" idx="1"/>
+          </p:nvPr>
+        </p:nvSpPr>
+        <p:spPr>
+          <a:xfrm>
+            <a:off x="1371600" y="1630710"/>
+            <a:ext cx="6400800" cy="4609893"/>
+          </a:xfrm>
+        </p:spPr>
+        <p:txBody>
+          <a:bodyPr>
+            <a:normAutofit fontScale="92500" lnSpcReduction="10000"/>
+          </a:bodyPr>
+          <a:lstStyle/>
+          <a:p>
+            <a:pPr algn="l"/>
+            <a:r>
+              <a:rPr lang="en-US" dirty="0" smtClean="0"/>
+              <a:t>Lifecycle</a:t>
+            </a:r>
+          </a:p>
+          <a:p>
+            <a:pPr marL="457200" indent="-457200" algn="l">
+              <a:buFont typeface="Arial"/>
+              <a:buChar char="•"/>
+            </a:pPr>
+            <a:r>
+              <a:rPr lang="en-US" dirty="0" smtClean="0"/>
+              <a:t>Readable</a:t>
+            </a:r>
+          </a:p>
+          <a:p>
+            <a:pPr marL="914400" lvl="1" indent="-457200" algn="l">
+              <a:buFont typeface="Arial"/>
+              <a:buChar char="•"/>
+            </a:pPr>
+            <a:r>
+              <a:rPr lang="en-US" dirty="0" smtClean="0"/>
+              <a:t>Starts paused</a:t>
+            </a:r>
+          </a:p>
+          <a:p>
+            <a:pPr marL="914400" lvl="1" indent="-457200" algn="l">
+              <a:buFont typeface="Arial"/>
+              <a:buChar char="•"/>
+            </a:pPr>
+            <a:r>
+              <a:rPr lang="en-US" dirty="0" smtClean="0"/>
+              <a:t>.read, .pipe or .on('data'… to start</a:t>
+            </a:r>
+          </a:p>
+          <a:p>
+            <a:pPr marL="914400" lvl="1" indent="-457200" algn="l">
+              <a:buFont typeface="Arial"/>
+              <a:buChar char="•"/>
+            </a:pPr>
+            <a:r>
+              <a:rPr lang="en-US" dirty="0" smtClean="0"/>
+              <a:t>No other pause guarantees</a:t>
+            </a:r>
+          </a:p>
+          <a:p>
+            <a:pPr marL="914400" lvl="1" indent="-457200" algn="l">
+              <a:buFont typeface="Arial"/>
+              <a:buChar char="•"/>
+            </a:pPr>
+            <a:r>
+              <a:rPr lang="en-US" dirty="0" smtClean="0"/>
+              <a:t>Emits 'end' when no more data</a:t>
+            </a:r>
+          </a:p>
+          <a:p>
+            <a:pPr marL="457200" indent="-457200" algn="l">
+              <a:buFont typeface="Arial"/>
+              <a:buChar char="•"/>
+            </a:pPr>
+            <a:r>
+              <a:rPr lang="en-US" dirty="0" smtClean="0"/>
+              <a:t>Writeable</a:t>
+            </a:r>
+          </a:p>
+          <a:p>
+            <a:pPr marL="914400" lvl="1" indent="-457200" algn="l">
+              <a:buFont typeface="Arial"/>
+              <a:buChar char="•"/>
+            </a:pPr>
+            <a:r>
+              <a:rPr lang="en-US" dirty="0" smtClean="0"/>
+              <a:t>Calls .end()</a:t>
+            </a:r>
+          </a:p>
+          <a:p>
+            <a:pPr marL="914400" lvl="1" indent="-457200" algn="l">
+              <a:buFont typeface="Arial"/>
+              <a:buChar char="•"/>
+            </a:pPr>
+            <a:r>
+              <a:rPr lang="en-US" dirty="0" smtClean="0"/>
+              <a:t>Emits 'finish'</a:t>
+            </a:r>
+          </a:p>
+          <a:p>
+            <a:pPr marL="914400" lvl="1" indent="-457200" algn="l">
+              <a:buFont typeface="Arial"/>
+              <a:buChar char="•"/>
+            </a:pPr>
+            <a:r>
+              <a:rPr lang="en-US" dirty="0" smtClean="0"/>
+              <a:t>Cleans up, emits 'close'</a:t>
+            </a:r>
+            <a:endParaRPr lang="en-US" dirty="0"/>
+          </a:p>
+        </p:txBody>
+      </p:sp>
+    </p:spTree>
+    <p:extLst>
+      <p:ext uri="{BB962C8B-B14F-4D97-AF65-F5344CB8AC3E}">
+        <p14:creationId xmlns:p14="http://schemas.microsoft.com/office/powerpoint/2010/main" val="2890279441"/>
+      </p:ext>
+    </p:extLst>
+  </p:cSld>
+  <p:clrMapOvr>
+    <a:masterClrMapping/>
+  </p:clrMapOvr>
+</p:sld>
+</file>
+
+<file path=ppt/slides/slide15.xml><?xml version="1.0" encoding="utf-8"?>
+<p:sld xmlns:a="http://schemas.openxmlformats.org/drawingml/2006/main" xmlns:r="http://schemas.openxmlformats.org/officeDocument/2006/relationships" xmlns:p="http://schemas.openxmlformats.org/presentationml/2006/main">
+  <p:cSld>
+    <p:spTree>
+      <p:nvGrpSpPr>
+        <p:cNvPr id="1" name=""/>
+        <p:cNvGrpSpPr/>
+        <p:nvPr/>
+      </p:nvGrpSpPr>
+      <p:grpSpPr>
+        <a:xfrm>
+          <a:off x="0" y="0"/>
+          <a:ext cx="0" cy="0"/>
+          <a:chOff x="0" y="0"/>
+          <a:chExt cx="0" cy="0"/>
+        </a:xfrm>
+      </p:grpSpPr>
+      <p:sp>
+        <p:nvSpPr>
+          <p:cNvPr id="2" name="Title 1"/>
+          <p:cNvSpPr>
+            <a:spLocks noGrp="1"/>
+          </p:cNvSpPr>
+          <p:nvPr>
+            <p:ph type="ctrTitle"/>
+          </p:nvPr>
+        </p:nvSpPr>
+        <p:spPr>
+          <a:xfrm>
+            <a:off x="685800" y="160685"/>
+            <a:ext cx="7772400" cy="1470025"/>
+          </a:xfrm>
+        </p:spPr>
+        <p:txBody>
+          <a:bodyPr/>
+          <a:lstStyle/>
+          <a:p>
+            <a:pPr marL="457200" indent="-457200"/>
+            <a:r>
+              <a:rPr lang="en-US" dirty="0" smtClean="0"/>
+              <a:t>Process</a:t>
+            </a:r>
+            <a:endParaRPr lang="en-US" dirty="0"/>
+          </a:p>
+        </p:txBody>
+      </p:sp>
+      <p:sp>
+        <p:nvSpPr>
+          <p:cNvPr id="3" name="Subtitle 2"/>
+          <p:cNvSpPr>
+            <a:spLocks noGrp="1"/>
+          </p:cNvSpPr>
+          <p:nvPr>
+            <p:ph type="subTitle" idx="1"/>
+          </p:nvPr>
+        </p:nvSpPr>
+        <p:spPr>
+          <a:xfrm>
+            <a:off x="1371600" y="1630710"/>
+            <a:ext cx="6400800" cy="4609893"/>
+          </a:xfrm>
+        </p:spPr>
+        <p:txBody>
+          <a:bodyPr>
+            <a:normAutofit/>
+          </a:bodyPr>
+          <a:lstStyle/>
+          <a:p>
+            <a:pPr marL="457200" indent="-457200" algn="l">
+              <a:buFont typeface="Arial"/>
+              <a:buChar char="•"/>
+            </a:pPr>
+            <a:r>
+              <a:rPr lang="en-US" dirty="0" smtClean="0"/>
+              <a:t>Global – no require() needed</a:t>
+            </a:r>
+          </a:p>
+          <a:p>
+            <a:pPr marL="457200" indent="-457200" algn="l">
+              <a:buFont typeface="Arial"/>
+              <a:buChar char="•"/>
+            </a:pPr>
+            <a:r>
+              <a:rPr lang="en-US" dirty="0" smtClean="0"/>
+              <a:t>Represents OS process</a:t>
+            </a:r>
+          </a:p>
+          <a:p>
+            <a:pPr marL="914400" lvl="1" indent="-457200" algn="l">
+              <a:buFont typeface="Arial"/>
+              <a:buChar char="•"/>
+            </a:pPr>
+            <a:r>
+              <a:rPr lang="en-US" dirty="0" smtClean="0"/>
+              <a:t>Info about </a:t>
+            </a:r>
+          </a:p>
+          <a:p>
+            <a:pPr marL="914400" lvl="1" indent="-457200" algn="l">
+              <a:buFont typeface="Arial"/>
+              <a:buChar char="•"/>
+            </a:pPr>
+            <a:r>
+              <a:rPr lang="en-US" dirty="0" smtClean="0"/>
+              <a:t>Control over</a:t>
+            </a:r>
+          </a:p>
+          <a:p>
+            <a:pPr marL="457200" indent="-457200" algn="l">
+              <a:buFont typeface="Arial"/>
+              <a:buChar char="•"/>
+            </a:pPr>
+            <a:r>
+              <a:rPr lang="en-US" dirty="0" err="1" smtClean="0"/>
+              <a:t>EventEmitter</a:t>
+            </a:r>
+            <a:endParaRPr lang="en-US" dirty="0"/>
+          </a:p>
+        </p:txBody>
+      </p:sp>
+    </p:spTree>
+    <p:extLst>
+      <p:ext uri="{BB962C8B-B14F-4D97-AF65-F5344CB8AC3E}">
+        <p14:creationId xmlns:p14="http://schemas.microsoft.com/office/powerpoint/2010/main" val="2133600796"/>
+      </p:ext>
+    </p:extLst>
+  </p:cSld>
+  <p:clrMapOvr>
+    <a:masterClrMapping/>
+  </p:clrMapOvr>
+</p:sld>
+</file>
+
+<file path=ppt/slides/slide16.xml><?xml version="1.0" encoding="utf-8"?>
+<p:sld xmlns:a="http://schemas.openxmlformats.org/drawingml/2006/main" xmlns:r="http://schemas.openxmlformats.org/officeDocument/2006/relationships" xmlns:p="http://schemas.openxmlformats.org/presentationml/2006/main">
+  <p:cSld>
+    <p:spTree>
+      <p:nvGrpSpPr>
+        <p:cNvPr id="1" name=""/>
+        <p:cNvGrpSpPr/>
+        <p:nvPr/>
+      </p:nvGrpSpPr>
+      <p:grpSpPr>
+        <a:xfrm>
+          <a:off x="0" y="0"/>
+          <a:ext cx="0" cy="0"/>
+          <a:chOff x="0" y="0"/>
+          <a:chExt cx="0" cy="0"/>
+        </a:xfrm>
+      </p:grpSpPr>
+      <p:sp>
+        <p:nvSpPr>
+          <p:cNvPr id="2" name="Title 1"/>
+          <p:cNvSpPr>
+            <a:spLocks noGrp="1"/>
+          </p:cNvSpPr>
+          <p:nvPr>
+            <p:ph type="ctrTitle"/>
+          </p:nvPr>
+        </p:nvSpPr>
+        <p:spPr>
+          <a:xfrm>
+            <a:off x="685800" y="160685"/>
+            <a:ext cx="7772400" cy="1470025"/>
+          </a:xfrm>
+        </p:spPr>
+        <p:txBody>
+          <a:bodyPr/>
+          <a:lstStyle/>
+          <a:p>
+            <a:pPr marL="457200" indent="-457200"/>
+            <a:r>
+              <a:rPr lang="en-US" dirty="0" smtClean="0"/>
+              <a:t>Process</a:t>
+            </a:r>
+            <a:endParaRPr lang="en-US" dirty="0"/>
+          </a:p>
+        </p:txBody>
+      </p:sp>
+      <p:sp>
+        <p:nvSpPr>
+          <p:cNvPr id="3" name="Subtitle 2"/>
+          <p:cNvSpPr>
+            <a:spLocks noGrp="1"/>
+          </p:cNvSpPr>
+          <p:nvPr>
+            <p:ph type="subTitle" idx="1"/>
+          </p:nvPr>
+        </p:nvSpPr>
+        <p:spPr>
+          <a:xfrm>
+            <a:off x="1371600" y="1630710"/>
+            <a:ext cx="6400800" cy="4609893"/>
+          </a:xfrm>
+        </p:spPr>
+        <p:txBody>
+          <a:bodyPr>
+            <a:normAutofit/>
+          </a:bodyPr>
+          <a:lstStyle/>
+          <a:p>
+            <a:pPr algn="l"/>
+            <a:r>
+              <a:rPr lang="en-US" dirty="0" smtClean="0"/>
+              <a:t>Info </a:t>
+            </a:r>
+          </a:p>
+          <a:p>
+            <a:pPr marL="457200" indent="-457200" algn="l">
+              <a:buFont typeface="Arial"/>
+              <a:buChar char="•"/>
+            </a:pPr>
+            <a:r>
+              <a:rPr lang="en-US" dirty="0" smtClean="0"/>
+              <a:t>Global – no require() needed</a:t>
+            </a:r>
+          </a:p>
+          <a:p>
+            <a:pPr marL="457200" indent="-457200" algn="l">
+              <a:buFont typeface="Arial"/>
+              <a:buChar char="•"/>
+            </a:pPr>
+            <a:r>
+              <a:rPr lang="en-US" dirty="0" smtClean="0"/>
+              <a:t>Represents OS process</a:t>
+            </a:r>
+          </a:p>
+          <a:p>
+            <a:pPr marL="914400" lvl="1" indent="-457200" algn="l">
+              <a:buFont typeface="Arial"/>
+              <a:buChar char="•"/>
+            </a:pPr>
+            <a:r>
+              <a:rPr lang="en-US" dirty="0" smtClean="0"/>
+              <a:t>Info about </a:t>
+            </a:r>
+          </a:p>
+          <a:p>
+            <a:pPr marL="914400" lvl="1" indent="-457200" algn="l">
+              <a:buFont typeface="Arial"/>
+              <a:buChar char="•"/>
+            </a:pPr>
+            <a:r>
+              <a:rPr lang="en-US" dirty="0" smtClean="0"/>
+              <a:t>Control over</a:t>
+            </a:r>
+          </a:p>
+          <a:p>
+            <a:pPr marL="457200" indent="-457200" algn="l">
+              <a:buFont typeface="Arial"/>
+              <a:buChar char="•"/>
+            </a:pPr>
+            <a:r>
+              <a:rPr lang="en-US" dirty="0" err="1" smtClean="0"/>
+              <a:t>EventEmitter</a:t>
+            </a:r>
+            <a:endParaRPr lang="en-US" dirty="0"/>
+          </a:p>
+        </p:txBody>
+      </p:sp>
+    </p:spTree>
+    <p:extLst>
+      <p:ext uri="{BB962C8B-B14F-4D97-AF65-F5344CB8AC3E}">
+        <p14:creationId xmlns:p14="http://schemas.microsoft.com/office/powerpoint/2010/main" val="2435394911"/>
+      </p:ext>
+    </p:extLst>
+  </p:cSld>
+  <p:clrMapOvr>
+    <a:masterClrMapping/>
+  </p:clrMapOvr>
+</p:sld>
+</file>
+
+<file path=ppt/slides/slide17.xml><?xml version="1.0" encoding="utf-8"?>
+<p:sld xmlns:a="http://schemas.openxmlformats.org/drawingml/2006/main" xmlns:r="http://schemas.openxmlformats.org/officeDocument/2006/relationships" xmlns:p="http://schemas.openxmlformats.org/presentationml/2006/main">
+  <p:cSld>
+    <p:spTree>
+      <p:nvGrpSpPr>
+        <p:cNvPr id="1" name=""/>
+        <p:cNvGrpSpPr/>
+        <p:nvPr/>
+      </p:nvGrpSpPr>
+      <p:grpSpPr>
+        <a:xfrm>
+          <a:off x="0" y="0"/>
+          <a:ext cx="0" cy="0"/>
+          <a:chOff x="0" y="0"/>
+          <a:chExt cx="0" cy="0"/>
+        </a:xfrm>
+      </p:grpSpPr>
+      <p:sp>
+        <p:nvSpPr>
+          <p:cNvPr id="2" name="Title 1"/>
+          <p:cNvSpPr>
+            <a:spLocks noGrp="1"/>
+          </p:cNvSpPr>
+          <p:nvPr>
+            <p:ph type="ctrTitle"/>
+          </p:nvPr>
+        </p:nvSpPr>
+        <p:spPr>
+          <a:xfrm>
+            <a:off x="685800" y="160685"/>
+            <a:ext cx="7772400" cy="1470025"/>
+          </a:xfrm>
+        </p:spPr>
+        <p:txBody>
+          <a:bodyPr/>
+          <a:lstStyle/>
+          <a:p>
+            <a:pPr marL="457200" indent="-457200"/>
+            <a:r>
+              <a:rPr lang="en-US" dirty="0" smtClean="0"/>
+              <a:t>Process</a:t>
+            </a:r>
+            <a:endParaRPr lang="en-US" dirty="0"/>
+          </a:p>
+        </p:txBody>
+      </p:sp>
+      <p:sp>
+        <p:nvSpPr>
+          <p:cNvPr id="3" name="Subtitle 2"/>
+          <p:cNvSpPr>
+            <a:spLocks noGrp="1"/>
+          </p:cNvSpPr>
+          <p:nvPr>
+            <p:ph type="subTitle" idx="1"/>
+          </p:nvPr>
+        </p:nvSpPr>
+        <p:spPr>
+          <a:xfrm>
+            <a:off x="1371600" y="1630710"/>
+            <a:ext cx="6400800" cy="4609893"/>
+          </a:xfrm>
+        </p:spPr>
+        <p:txBody>
+          <a:bodyPr>
+            <a:normAutofit/>
+          </a:bodyPr>
+          <a:lstStyle/>
+          <a:p>
+            <a:pPr algn="l"/>
+            <a:r>
+              <a:rPr lang="en-US" dirty="0" err="1"/>
+              <a:t>process.argv</a:t>
+            </a:r>
+            <a:endParaRPr lang="en-US" dirty="0" smtClean="0"/>
+          </a:p>
+          <a:p>
+            <a:pPr marL="457200" indent="-457200" algn="l">
+              <a:buFont typeface="Arial"/>
+              <a:buChar char="•"/>
+            </a:pPr>
+            <a:r>
+              <a:rPr lang="en-US" dirty="0" smtClean="0"/>
+              <a:t>Returns an array </a:t>
+            </a:r>
+          </a:p>
+          <a:p>
+            <a:pPr marL="457200" indent="-457200" algn="l">
+              <a:buFont typeface="Arial"/>
+              <a:buChar char="•"/>
+            </a:pPr>
+            <a:r>
+              <a:rPr lang="en-US" dirty="0" smtClean="0"/>
+              <a:t>Parameters from launch</a:t>
+            </a:r>
+          </a:p>
+          <a:p>
+            <a:pPr marL="914400" lvl="1" indent="-457200" algn="l">
+              <a:buFont typeface="Arial"/>
+              <a:buChar char="•"/>
+            </a:pPr>
+            <a:r>
+              <a:rPr lang="en-US" dirty="0" smtClean="0"/>
+              <a:t>Absolute </a:t>
+            </a:r>
+            <a:r>
+              <a:rPr lang="en-US" dirty="0"/>
+              <a:t>pathname of </a:t>
+            </a:r>
+            <a:r>
+              <a:rPr lang="en-US" dirty="0" smtClean="0"/>
+              <a:t>executable</a:t>
+            </a:r>
+          </a:p>
+          <a:p>
+            <a:pPr marL="914400" lvl="1" indent="-457200" algn="l">
+              <a:buFont typeface="Arial"/>
+              <a:buChar char="•"/>
+            </a:pPr>
+            <a:r>
+              <a:rPr lang="en-US" dirty="0" smtClean="0"/>
+              <a:t>Path to JS file being executed</a:t>
+            </a:r>
+          </a:p>
+          <a:p>
+            <a:pPr marL="914400" lvl="1" indent="-457200" algn="l">
+              <a:buFont typeface="Arial"/>
+              <a:buChar char="•"/>
+            </a:pPr>
+            <a:r>
+              <a:rPr lang="en-US" dirty="0" smtClean="0"/>
+              <a:t>Next n elements CLI arguments</a:t>
+            </a:r>
+          </a:p>
+          <a:p>
+            <a:pPr marL="457200" indent="-457200" algn="l">
+              <a:buFont typeface="Arial"/>
+              <a:buChar char="•"/>
+            </a:pPr>
+            <a:r>
+              <a:rPr lang="en-US" dirty="0" smtClean="0"/>
+              <a:t>.argv0 stores original executable </a:t>
+            </a:r>
+            <a:r>
+              <a:rPr lang="en-US" dirty="0" err="1" smtClean="0"/>
+              <a:t>arg</a:t>
+            </a:r>
+            <a:r>
+              <a:rPr lang="en-US" dirty="0" smtClean="0"/>
+              <a:t> (if the </a:t>
+            </a:r>
+            <a:r>
+              <a:rPr lang="en-US" dirty="0"/>
+              <a:t>shell</a:t>
+            </a:r>
+            <a:r>
+              <a:rPr lang="en-US" dirty="0" smtClean="0"/>
+              <a:t> expanded it)</a:t>
+            </a:r>
+          </a:p>
+        </p:txBody>
+      </p:sp>
+    </p:spTree>
+    <p:extLst>
+      <p:ext uri="{BB962C8B-B14F-4D97-AF65-F5344CB8AC3E}">
+        <p14:creationId xmlns:p14="http://schemas.microsoft.com/office/powerpoint/2010/main" val="1143942686"/>
+      </p:ext>
+    </p:extLst>
+  </p:cSld>
+  <p:clrMapOvr>
+    <a:masterClrMapping/>
+  </p:clrMapOvr>
+</p:sld>
+</file>
+
+<file path=ppt/slides/slide18.xml><?xml version="1.0" encoding="utf-8"?>
+<p:sld xmlns:a="http://schemas.openxmlformats.org/drawingml/2006/main" xmlns:r="http://schemas.openxmlformats.org/officeDocument/2006/relationships" xmlns:p="http://schemas.openxmlformats.org/presentationml/2006/main">
+  <p:cSld>
+    <p:spTree>
+      <p:nvGrpSpPr>
+        <p:cNvPr id="1" name=""/>
+        <p:cNvGrpSpPr/>
+        <p:nvPr/>
+      </p:nvGrpSpPr>
+      <p:grpSpPr>
+        <a:xfrm>
+          <a:off x="0" y="0"/>
+          <a:ext cx="0" cy="0"/>
+          <a:chOff x="0" y="0"/>
+          <a:chExt cx="0" cy="0"/>
+        </a:xfrm>
+      </p:grpSpPr>
+      <p:sp>
+        <p:nvSpPr>
+          <p:cNvPr id="2" name="Title 1"/>
+          <p:cNvSpPr>
+            <a:spLocks noGrp="1"/>
+          </p:cNvSpPr>
+          <p:nvPr>
+            <p:ph type="ctrTitle"/>
+          </p:nvPr>
+        </p:nvSpPr>
+        <p:spPr>
+          <a:xfrm>
+            <a:off x="685800" y="160685"/>
+            <a:ext cx="7772400" cy="1470025"/>
+          </a:xfrm>
+        </p:spPr>
+        <p:txBody>
+          <a:bodyPr/>
+          <a:lstStyle/>
+          <a:p>
+            <a:pPr marL="457200" indent="-457200"/>
+            <a:r>
+              <a:rPr lang="en-US" dirty="0" smtClean="0"/>
+              <a:t>Process</a:t>
+            </a:r>
+            <a:endParaRPr lang="en-US" dirty="0"/>
+          </a:p>
+        </p:txBody>
+      </p:sp>
+      <p:sp>
+        <p:nvSpPr>
+          <p:cNvPr id="3" name="Subtitle 2"/>
+          <p:cNvSpPr>
+            <a:spLocks noGrp="1"/>
+          </p:cNvSpPr>
+          <p:nvPr>
+            <p:ph type="subTitle" idx="1"/>
+          </p:nvPr>
+        </p:nvSpPr>
+        <p:spPr>
+          <a:xfrm>
+            <a:off x="1371600" y="1630710"/>
+            <a:ext cx="6400800" cy="4609893"/>
+          </a:xfrm>
+        </p:spPr>
+        <p:txBody>
+          <a:bodyPr>
+            <a:normAutofit fontScale="92500" lnSpcReduction="10000"/>
+          </a:bodyPr>
+          <a:lstStyle/>
+          <a:p>
+            <a:pPr algn="l"/>
+            <a:r>
+              <a:rPr lang="en-US" dirty="0" smtClean="0"/>
+              <a:t>More process methods</a:t>
+            </a:r>
+          </a:p>
+          <a:p>
+            <a:pPr marL="457200" indent="-457200" algn="l">
+              <a:buFont typeface="Arial"/>
+              <a:buChar char="•"/>
+            </a:pPr>
+            <a:r>
+              <a:rPr lang="en-US" dirty="0" smtClean="0"/>
+              <a:t>abort (core dump)</a:t>
+            </a:r>
+          </a:p>
+          <a:p>
+            <a:pPr marL="457200" indent="-457200" algn="l">
+              <a:buFont typeface="Arial"/>
+              <a:buChar char="•"/>
+            </a:pPr>
+            <a:r>
+              <a:rPr lang="en-US" dirty="0" err="1" smtClean="0"/>
+              <a:t>cpuUsage</a:t>
+            </a:r>
+            <a:endParaRPr lang="en-US" dirty="0" smtClean="0"/>
+          </a:p>
+          <a:p>
+            <a:pPr marL="457200" indent="-457200" algn="l">
+              <a:buFont typeface="Arial"/>
+              <a:buChar char="•"/>
+            </a:pPr>
+            <a:r>
+              <a:rPr lang="en-US" dirty="0" err="1" smtClean="0"/>
+              <a:t>cwd</a:t>
+            </a:r>
+            <a:r>
+              <a:rPr lang="en-US" dirty="0" smtClean="0"/>
+              <a:t> (change working </a:t>
+            </a:r>
+            <a:r>
+              <a:rPr lang="en-US" dirty="0" err="1" smtClean="0"/>
+              <a:t>dir</a:t>
+            </a:r>
+            <a:r>
+              <a:rPr lang="en-US" dirty="0" smtClean="0"/>
+              <a:t>)</a:t>
+            </a:r>
+          </a:p>
+          <a:p>
+            <a:pPr marL="457200" indent="-457200" algn="l">
+              <a:buFont typeface="Arial"/>
+              <a:buChar char="•"/>
+            </a:pPr>
+            <a:r>
+              <a:rPr lang="en-US" dirty="0" err="1" smtClean="0"/>
+              <a:t>env</a:t>
+            </a:r>
+            <a:r>
+              <a:rPr lang="en-US" dirty="0" smtClean="0"/>
+              <a:t> (user environment)</a:t>
+            </a:r>
+          </a:p>
+          <a:p>
+            <a:pPr marL="457200" indent="-457200" algn="l">
+              <a:buFont typeface="Arial"/>
+              <a:buChar char="•"/>
+            </a:pPr>
+            <a:r>
+              <a:rPr lang="en-US" dirty="0" smtClean="0"/>
+              <a:t>exit – usually not called directly</a:t>
+            </a:r>
+          </a:p>
+          <a:p>
+            <a:pPr marL="914400" lvl="1" indent="-457200" algn="l">
+              <a:buFont typeface="Arial"/>
+              <a:buChar char="•"/>
+            </a:pPr>
+            <a:r>
+              <a:rPr lang="en-US" dirty="0" smtClean="0"/>
+              <a:t>Throw an Error </a:t>
+            </a:r>
+          </a:p>
+          <a:p>
+            <a:pPr marL="914400" lvl="1" indent="-457200" algn="l">
+              <a:buFont typeface="Arial"/>
+              <a:buChar char="•"/>
+            </a:pPr>
+            <a:r>
+              <a:rPr lang="en-US" dirty="0" smtClean="0"/>
+              <a:t>Emit 'error'</a:t>
+            </a:r>
+          </a:p>
+          <a:p>
+            <a:pPr marL="914400" lvl="1" indent="-457200" algn="l">
+              <a:buFont typeface="Arial"/>
+              <a:buChar char="•"/>
+            </a:pPr>
+            <a:r>
+              <a:rPr lang="en-US" dirty="0" smtClean="0"/>
+              <a:t>Or set .</a:t>
+            </a:r>
+            <a:r>
+              <a:rPr lang="en-US" dirty="0" err="1" smtClean="0"/>
+              <a:t>exitCode</a:t>
+            </a:r>
+            <a:r>
+              <a:rPr lang="en-US" dirty="0" smtClean="0"/>
+              <a:t>() and let loop finish</a:t>
+            </a:r>
+          </a:p>
+          <a:p>
+            <a:pPr marL="457200" indent="-457200" algn="l">
+              <a:buFont typeface="Arial"/>
+              <a:buChar char="•"/>
+            </a:pPr>
+            <a:endParaRPr lang="en-US" dirty="0" smtClean="0"/>
+          </a:p>
+        </p:txBody>
+      </p:sp>
+    </p:spTree>
+    <p:extLst>
+      <p:ext uri="{BB962C8B-B14F-4D97-AF65-F5344CB8AC3E}">
+        <p14:creationId xmlns:p14="http://schemas.microsoft.com/office/powerpoint/2010/main" val="2327375216"/>
+      </p:ext>
+    </p:extLst>
+  </p:cSld>
+  <p:clrMapOvr>
+    <a:masterClrMapping/>
+  </p:clrMapOvr>
+</p:sld>
+</file>
+
+<file path=ppt/slides/slide19.xml><?xml version="1.0" encoding="utf-8"?>
+<p:sld xmlns:a="http://schemas.openxmlformats.org/drawingml/2006/main" xmlns:r="http://schemas.openxmlformats.org/officeDocument/2006/relationships" xmlns:p="http://schemas.openxmlformats.org/presentationml/2006/main">
+  <p:cSld>
+    <p:spTree>
+      <p:nvGrpSpPr>
+        <p:cNvPr id="1" name=""/>
+        <p:cNvGrpSpPr/>
+        <p:nvPr/>
+      </p:nvGrpSpPr>
+      <p:grpSpPr>
+        <a:xfrm>
+          <a:off x="0" y="0"/>
+          <a:ext cx="0" cy="0"/>
+          <a:chOff x="0" y="0"/>
+          <a:chExt cx="0" cy="0"/>
+        </a:xfrm>
+      </p:grpSpPr>
+      <p:sp>
+        <p:nvSpPr>
+          <p:cNvPr id="2" name="Title 1"/>
+          <p:cNvSpPr>
+            <a:spLocks noGrp="1"/>
+          </p:cNvSpPr>
+          <p:nvPr>
+            <p:ph type="ctrTitle"/>
+          </p:nvPr>
+        </p:nvSpPr>
+        <p:spPr>
+          <a:xfrm>
+            <a:off x="685800" y="160685"/>
+            <a:ext cx="7772400" cy="1470025"/>
+          </a:xfrm>
+        </p:spPr>
+        <p:txBody>
+          <a:bodyPr/>
+          <a:lstStyle/>
+          <a:p>
+            <a:pPr marL="457200" indent="-457200"/>
+            <a:r>
+              <a:rPr lang="en-US" dirty="0" smtClean="0"/>
+              <a:t>Process</a:t>
+            </a:r>
+            <a:endParaRPr lang="en-US" dirty="0"/>
+          </a:p>
+        </p:txBody>
+      </p:sp>
+      <p:sp>
+        <p:nvSpPr>
+          <p:cNvPr id="3" name="Subtitle 2"/>
+          <p:cNvSpPr>
+            <a:spLocks noGrp="1"/>
+          </p:cNvSpPr>
+          <p:nvPr>
+            <p:ph type="subTitle" idx="1"/>
+          </p:nvPr>
+        </p:nvSpPr>
+        <p:spPr>
+          <a:xfrm>
+            <a:off x="1371600" y="1630710"/>
+            <a:ext cx="6400800" cy="4609893"/>
+          </a:xfrm>
+        </p:spPr>
+        <p:txBody>
+          <a:bodyPr>
+            <a:normAutofit/>
+          </a:bodyPr>
+          <a:lstStyle/>
+          <a:p>
+            <a:pPr algn="l"/>
+            <a:r>
+              <a:rPr lang="en-US" dirty="0" smtClean="0"/>
+              <a:t>More process methods</a:t>
+            </a:r>
+          </a:p>
+          <a:p>
+            <a:pPr marL="457200" indent="-457200" algn="l">
+              <a:buFont typeface="Arial"/>
+              <a:buChar char="•"/>
+            </a:pPr>
+            <a:r>
+              <a:rPr lang="en-US" dirty="0" smtClean="0"/>
+              <a:t>kill (send SIG to PID)</a:t>
+            </a:r>
+          </a:p>
+          <a:p>
+            <a:pPr marL="457200" indent="-457200" algn="l">
+              <a:buFont typeface="Arial"/>
+              <a:buChar char="•"/>
+            </a:pPr>
+            <a:r>
+              <a:rPr lang="en-US" dirty="0" err="1" smtClean="0"/>
+              <a:t>mainModule</a:t>
+            </a:r>
+            <a:r>
+              <a:rPr lang="en-US" dirty="0" smtClean="0"/>
+              <a:t> (direct entry script)</a:t>
+            </a:r>
+          </a:p>
+          <a:p>
+            <a:pPr marL="457200" indent="-457200" algn="l">
+              <a:buFont typeface="Arial"/>
+              <a:buChar char="•"/>
+            </a:pPr>
+            <a:r>
+              <a:rPr lang="en-US" dirty="0" err="1" smtClean="0"/>
+              <a:t>memoryUsage</a:t>
+            </a:r>
+            <a:endParaRPr lang="en-US" dirty="0" smtClean="0"/>
+          </a:p>
+          <a:p>
+            <a:pPr marL="457200" indent="-457200" algn="l">
+              <a:buFont typeface="Arial"/>
+              <a:buChar char="•"/>
+            </a:pPr>
+            <a:endParaRPr lang="en-US" dirty="0" smtClean="0"/>
+          </a:p>
+        </p:txBody>
+      </p:sp>
+    </p:spTree>
+    <p:extLst>
+      <p:ext uri="{BB962C8B-B14F-4D97-AF65-F5344CB8AC3E}">
+        <p14:creationId xmlns:p14="http://schemas.microsoft.com/office/powerpoint/2010/main" val="245110341"/>
+      </p:ext>
+    </p:extLst>
+  </p:cSld>
+  <p:clrMapOvr>
+    <a:masterClrMapping/>
+  </p:clrMapOvr>
+</p:sld>
+</file>
+
 <file path=ppt/slides/slide2.xml><?xml version="1.0" encoding="utf-8"?>
 <p:sld xmlns:a="http://schemas.openxmlformats.org/drawingml/2006/main" xmlns:r="http://schemas.openxmlformats.org/officeDocument/2006/relationships" xmlns:p="http://schemas.openxmlformats.org/presentationml/2006/main">
   <p:cSld>
@@ -3394,6 +4997,572 @@
     <p:extLst>
       <p:ext uri="{BB962C8B-B14F-4D97-AF65-F5344CB8AC3E}">
         <p14:creationId xmlns:p14="http://schemas.microsoft.com/office/powerpoint/2010/main" val="1017120299"/>
+      </p:ext>
+    </p:extLst>
+  </p:cSld>
+  <p:clrMapOvr>
+    <a:masterClrMapping/>
+  </p:clrMapOvr>
+</p:sld>
+</file>
+
+<file path=ppt/slides/slide20.xml><?xml version="1.0" encoding="utf-8"?>
+<p:sld xmlns:a="http://schemas.openxmlformats.org/drawingml/2006/main" xmlns:r="http://schemas.openxmlformats.org/officeDocument/2006/relationships" xmlns:p="http://schemas.openxmlformats.org/presentationml/2006/main">
+  <p:cSld>
+    <p:spTree>
+      <p:nvGrpSpPr>
+        <p:cNvPr id="1" name=""/>
+        <p:cNvGrpSpPr/>
+        <p:nvPr/>
+      </p:nvGrpSpPr>
+      <p:grpSpPr>
+        <a:xfrm>
+          <a:off x="0" y="0"/>
+          <a:ext cx="0" cy="0"/>
+          <a:chOff x="0" y="0"/>
+          <a:chExt cx="0" cy="0"/>
+        </a:xfrm>
+      </p:grpSpPr>
+      <p:sp>
+        <p:nvSpPr>
+          <p:cNvPr id="2" name="Title 1"/>
+          <p:cNvSpPr>
+            <a:spLocks noGrp="1"/>
+          </p:cNvSpPr>
+          <p:nvPr>
+            <p:ph type="ctrTitle"/>
+          </p:nvPr>
+        </p:nvSpPr>
+        <p:spPr>
+          <a:xfrm>
+            <a:off x="685800" y="160685"/>
+            <a:ext cx="7772400" cy="1470025"/>
+          </a:xfrm>
+        </p:spPr>
+        <p:txBody>
+          <a:bodyPr/>
+          <a:lstStyle/>
+          <a:p>
+            <a:pPr marL="457200" indent="-457200"/>
+            <a:r>
+              <a:rPr lang="en-US" dirty="0" smtClean="0"/>
+              <a:t>Process</a:t>
+            </a:r>
+            <a:endParaRPr lang="en-US" dirty="0"/>
+          </a:p>
+        </p:txBody>
+      </p:sp>
+      <p:sp>
+        <p:nvSpPr>
+          <p:cNvPr id="3" name="Subtitle 2"/>
+          <p:cNvSpPr>
+            <a:spLocks noGrp="1"/>
+          </p:cNvSpPr>
+          <p:nvPr>
+            <p:ph type="subTitle" idx="1"/>
+          </p:nvPr>
+        </p:nvSpPr>
+        <p:spPr>
+          <a:xfrm>
+            <a:off x="1371600" y="1630710"/>
+            <a:ext cx="6400800" cy="4609893"/>
+          </a:xfrm>
+        </p:spPr>
+        <p:txBody>
+          <a:bodyPr>
+            <a:normAutofit/>
+          </a:bodyPr>
+          <a:lstStyle/>
+          <a:p>
+            <a:pPr algn="l"/>
+            <a:r>
+              <a:rPr lang="en-US" dirty="0" smtClean="0"/>
+              <a:t>process.</a:t>
+            </a:r>
+            <a:r>
+              <a:rPr lang="en-US" dirty="0"/>
+              <a:t> </a:t>
+            </a:r>
+            <a:r>
+              <a:rPr lang="en-US" dirty="0" err="1" smtClean="0"/>
+              <a:t>nextTick</a:t>
+            </a:r>
+            <a:r>
+              <a:rPr lang="en-US" dirty="0" smtClean="0"/>
+              <a:t>( callback [,</a:t>
+            </a:r>
+            <a:r>
+              <a:rPr lang="en-US" dirty="0" err="1" smtClean="0"/>
+              <a:t>args</a:t>
+            </a:r>
+            <a:r>
+              <a:rPr lang="en-US" dirty="0" smtClean="0"/>
+              <a:t>] )</a:t>
+            </a:r>
+          </a:p>
+          <a:p>
+            <a:pPr marL="457200" indent="-457200" algn="l">
+              <a:buFont typeface="Arial"/>
+              <a:buChar char="•"/>
+            </a:pPr>
+            <a:r>
+              <a:rPr lang="en-US" dirty="0" smtClean="0"/>
+              <a:t>Adds callback to next 'tick'</a:t>
+            </a:r>
+          </a:p>
+          <a:p>
+            <a:pPr marL="914400" lvl="1" indent="-457200" algn="l">
+              <a:buFont typeface="Arial"/>
+              <a:buChar char="•"/>
+            </a:pPr>
+            <a:r>
+              <a:rPr lang="en-US" dirty="0" smtClean="0"/>
+              <a:t>After this call stack</a:t>
+            </a:r>
+          </a:p>
+          <a:p>
+            <a:pPr marL="914400" lvl="1" indent="-457200" algn="l">
+              <a:buFont typeface="Arial"/>
+              <a:buChar char="•"/>
+            </a:pPr>
+            <a:r>
+              <a:rPr lang="en-US" dirty="0" smtClean="0"/>
+              <a:t>But before any pending I/O event</a:t>
+            </a:r>
+          </a:p>
+          <a:p>
+            <a:pPr marL="457200" indent="-457200" algn="l">
+              <a:buFont typeface="Arial"/>
+              <a:buChar char="•"/>
+            </a:pPr>
+            <a:r>
+              <a:rPr lang="en-US" dirty="0" smtClean="0"/>
+              <a:t>Uses </a:t>
+            </a:r>
+          </a:p>
+          <a:p>
+            <a:pPr marL="914400" lvl="1" indent="-457200" algn="l">
+              <a:buFont typeface="Arial"/>
+              <a:buChar char="•"/>
+            </a:pPr>
+            <a:r>
+              <a:rPr lang="en-US" dirty="0" smtClean="0"/>
+              <a:t>add listeners after object created</a:t>
+            </a:r>
+          </a:p>
+          <a:p>
+            <a:pPr marL="914400" lvl="1" indent="-457200" algn="l">
+              <a:buFont typeface="Arial"/>
+              <a:buChar char="•"/>
+            </a:pPr>
+            <a:r>
+              <a:rPr lang="en-US" dirty="0" smtClean="0"/>
+              <a:t>Avoid sync actions within </a:t>
+            </a:r>
+            <a:r>
+              <a:rPr lang="en-US" dirty="0" err="1" smtClean="0"/>
+              <a:t>async</a:t>
+            </a:r>
+            <a:endParaRPr lang="en-US" dirty="0" smtClean="0"/>
+          </a:p>
+        </p:txBody>
+      </p:sp>
+    </p:spTree>
+    <p:extLst>
+      <p:ext uri="{BB962C8B-B14F-4D97-AF65-F5344CB8AC3E}">
+        <p14:creationId xmlns:p14="http://schemas.microsoft.com/office/powerpoint/2010/main" val="2887572931"/>
+      </p:ext>
+    </p:extLst>
+  </p:cSld>
+  <p:clrMapOvr>
+    <a:masterClrMapping/>
+  </p:clrMapOvr>
+</p:sld>
+</file>
+
+<file path=ppt/slides/slide21.xml><?xml version="1.0" encoding="utf-8"?>
+<p:sld xmlns:a="http://schemas.openxmlformats.org/drawingml/2006/main" xmlns:r="http://schemas.openxmlformats.org/officeDocument/2006/relationships" xmlns:p="http://schemas.openxmlformats.org/presentationml/2006/main">
+  <p:cSld>
+    <p:spTree>
+      <p:nvGrpSpPr>
+        <p:cNvPr id="1" name=""/>
+        <p:cNvGrpSpPr/>
+        <p:nvPr/>
+      </p:nvGrpSpPr>
+      <p:grpSpPr>
+        <a:xfrm>
+          <a:off x="0" y="0"/>
+          <a:ext cx="0" cy="0"/>
+          <a:chOff x="0" y="0"/>
+          <a:chExt cx="0" cy="0"/>
+        </a:xfrm>
+      </p:grpSpPr>
+      <p:sp>
+        <p:nvSpPr>
+          <p:cNvPr id="2" name="Title 1"/>
+          <p:cNvSpPr>
+            <a:spLocks noGrp="1"/>
+          </p:cNvSpPr>
+          <p:nvPr>
+            <p:ph type="ctrTitle"/>
+          </p:nvPr>
+        </p:nvSpPr>
+        <p:spPr>
+          <a:xfrm>
+            <a:off x="685800" y="160685"/>
+            <a:ext cx="7772400" cy="1470025"/>
+          </a:xfrm>
+        </p:spPr>
+        <p:txBody>
+          <a:bodyPr/>
+          <a:lstStyle/>
+          <a:p>
+            <a:pPr marL="457200" indent="-457200"/>
+            <a:r>
+              <a:rPr lang="en-US" dirty="0" smtClean="0"/>
+              <a:t>Process</a:t>
+            </a:r>
+            <a:endParaRPr lang="en-US" dirty="0"/>
+          </a:p>
+        </p:txBody>
+      </p:sp>
+      <p:sp>
+        <p:nvSpPr>
+          <p:cNvPr id="3" name="Subtitle 2"/>
+          <p:cNvSpPr>
+            <a:spLocks noGrp="1"/>
+          </p:cNvSpPr>
+          <p:nvPr>
+            <p:ph type="subTitle" idx="1"/>
+          </p:nvPr>
+        </p:nvSpPr>
+        <p:spPr>
+          <a:xfrm>
+            <a:off x="1371600" y="1630710"/>
+            <a:ext cx="6400800" cy="4609893"/>
+          </a:xfrm>
+        </p:spPr>
+        <p:txBody>
+          <a:bodyPr>
+            <a:normAutofit/>
+          </a:bodyPr>
+          <a:lstStyle/>
+          <a:p>
+            <a:pPr algn="l"/>
+            <a:r>
+              <a:rPr lang="en-US" dirty="0" smtClean="0"/>
+              <a:t>More process methods</a:t>
+            </a:r>
+          </a:p>
+          <a:p>
+            <a:pPr marL="457200" indent="-457200" algn="l">
+              <a:buFont typeface="Arial"/>
+              <a:buChar char="•"/>
+            </a:pPr>
+            <a:r>
+              <a:rPr lang="en-US" dirty="0" err="1" smtClean="0"/>
+              <a:t>pid</a:t>
+            </a:r>
+            <a:r>
+              <a:rPr lang="en-US" dirty="0" smtClean="0"/>
+              <a:t> (id for this process)</a:t>
+            </a:r>
+          </a:p>
+          <a:p>
+            <a:pPr marL="457200" indent="-457200" algn="l">
+              <a:buFont typeface="Arial"/>
+              <a:buChar char="•"/>
+            </a:pPr>
+            <a:r>
+              <a:rPr lang="en-US" dirty="0" smtClean="0"/>
+              <a:t>release (node info)</a:t>
+            </a:r>
+          </a:p>
+          <a:p>
+            <a:pPr marL="457200" indent="-457200" algn="l">
+              <a:buFont typeface="Arial"/>
+              <a:buChar char="•"/>
+            </a:pPr>
+            <a:r>
+              <a:rPr lang="en-US" dirty="0" smtClean="0"/>
+              <a:t>version (node version)</a:t>
+            </a:r>
+          </a:p>
+          <a:p>
+            <a:pPr marL="457200" indent="-457200" algn="l">
+              <a:buFont typeface="Arial"/>
+              <a:buChar char="•"/>
+            </a:pPr>
+            <a:r>
+              <a:rPr lang="en-US" dirty="0" smtClean="0"/>
+              <a:t>versions </a:t>
+            </a:r>
+            <a:r>
+              <a:rPr lang="en-US" dirty="0"/>
+              <a:t>(node </a:t>
+            </a:r>
+            <a:r>
+              <a:rPr lang="en-US" dirty="0" smtClean="0"/>
+              <a:t>subcomponents)</a:t>
+            </a:r>
+            <a:endParaRPr lang="en-US" dirty="0"/>
+          </a:p>
+          <a:p>
+            <a:pPr marL="457200" indent="-457200" algn="l">
+              <a:buFont typeface="Arial"/>
+              <a:buChar char="•"/>
+            </a:pPr>
+            <a:endParaRPr lang="en-US" dirty="0" smtClean="0"/>
+          </a:p>
+        </p:txBody>
+      </p:sp>
+    </p:spTree>
+    <p:extLst>
+      <p:ext uri="{BB962C8B-B14F-4D97-AF65-F5344CB8AC3E}">
+        <p14:creationId xmlns:p14="http://schemas.microsoft.com/office/powerpoint/2010/main" val="3838392672"/>
+      </p:ext>
+    </p:extLst>
+  </p:cSld>
+  <p:clrMapOvr>
+    <a:masterClrMapping/>
+  </p:clrMapOvr>
+</p:sld>
+</file>
+
+<file path=ppt/slides/slide22.xml><?xml version="1.0" encoding="utf-8"?>
+<p:sld xmlns:a="http://schemas.openxmlformats.org/drawingml/2006/main" xmlns:r="http://schemas.openxmlformats.org/officeDocument/2006/relationships" xmlns:p="http://schemas.openxmlformats.org/presentationml/2006/main">
+  <p:cSld>
+    <p:spTree>
+      <p:nvGrpSpPr>
+        <p:cNvPr id="1" name=""/>
+        <p:cNvGrpSpPr/>
+        <p:nvPr/>
+      </p:nvGrpSpPr>
+      <p:grpSpPr>
+        <a:xfrm>
+          <a:off x="0" y="0"/>
+          <a:ext cx="0" cy="0"/>
+          <a:chOff x="0" y="0"/>
+          <a:chExt cx="0" cy="0"/>
+        </a:xfrm>
+      </p:grpSpPr>
+      <p:sp>
+        <p:nvSpPr>
+          <p:cNvPr id="2" name="Title 1"/>
+          <p:cNvSpPr>
+            <a:spLocks noGrp="1"/>
+          </p:cNvSpPr>
+          <p:nvPr>
+            <p:ph type="ctrTitle"/>
+          </p:nvPr>
+        </p:nvSpPr>
+        <p:spPr>
+          <a:xfrm>
+            <a:off x="685800" y="160685"/>
+            <a:ext cx="7772400" cy="1470025"/>
+          </a:xfrm>
+        </p:spPr>
+        <p:txBody>
+          <a:bodyPr/>
+          <a:lstStyle/>
+          <a:p>
+            <a:pPr marL="457200" indent="-457200"/>
+            <a:r>
+              <a:rPr lang="en-US" dirty="0" smtClean="0"/>
+              <a:t>Process</a:t>
+            </a:r>
+            <a:endParaRPr lang="en-US" dirty="0"/>
+          </a:p>
+        </p:txBody>
+      </p:sp>
+      <p:sp>
+        <p:nvSpPr>
+          <p:cNvPr id="3" name="Subtitle 2"/>
+          <p:cNvSpPr>
+            <a:spLocks noGrp="1"/>
+          </p:cNvSpPr>
+          <p:nvPr>
+            <p:ph type="subTitle" idx="1"/>
+          </p:nvPr>
+        </p:nvSpPr>
+        <p:spPr>
+          <a:xfrm>
+            <a:off x="1371600" y="1630710"/>
+            <a:ext cx="6400800" cy="4609893"/>
+          </a:xfrm>
+        </p:spPr>
+        <p:txBody>
+          <a:bodyPr>
+            <a:normAutofit/>
+          </a:bodyPr>
+          <a:lstStyle/>
+          <a:p>
+            <a:pPr algn="l"/>
+            <a:r>
+              <a:rPr lang="en-US" dirty="0" smtClean="0"/>
+              <a:t>process streams</a:t>
+            </a:r>
+          </a:p>
+          <a:p>
+            <a:pPr marL="457200" indent="-457200" algn="l">
+              <a:buFont typeface="Arial"/>
+              <a:buChar char="•"/>
+            </a:pPr>
+            <a:r>
+              <a:rPr lang="en-US" dirty="0" err="1" smtClean="0"/>
+              <a:t>stderr</a:t>
+            </a:r>
+            <a:endParaRPr lang="en-US" dirty="0" smtClean="0"/>
+          </a:p>
+          <a:p>
+            <a:pPr marL="457200" indent="-457200" algn="l">
+              <a:buFont typeface="Arial"/>
+              <a:buChar char="•"/>
+            </a:pPr>
+            <a:r>
+              <a:rPr lang="en-US" dirty="0" err="1" smtClean="0"/>
+              <a:t>stdin</a:t>
+            </a:r>
+            <a:endParaRPr lang="en-US" dirty="0"/>
+          </a:p>
+          <a:p>
+            <a:pPr marL="457200" indent="-457200" algn="l">
+              <a:buFont typeface="Arial"/>
+              <a:buChar char="•"/>
+            </a:pPr>
+            <a:r>
+              <a:rPr lang="en-US" dirty="0" err="1" smtClean="0"/>
+              <a:t>stdout</a:t>
+            </a:r>
+            <a:endParaRPr lang="en-US" dirty="0" smtClean="0"/>
+          </a:p>
+        </p:txBody>
+      </p:sp>
+    </p:spTree>
+    <p:extLst>
+      <p:ext uri="{BB962C8B-B14F-4D97-AF65-F5344CB8AC3E}">
+        <p14:creationId xmlns:p14="http://schemas.microsoft.com/office/powerpoint/2010/main" val="1689350104"/>
+      </p:ext>
+    </p:extLst>
+  </p:cSld>
+  <p:clrMapOvr>
+    <a:masterClrMapping/>
+  </p:clrMapOvr>
+</p:sld>
+</file>
+
+<file path=ppt/slides/slide23.xml><?xml version="1.0" encoding="utf-8"?>
+<p:sld xmlns:a="http://schemas.openxmlformats.org/drawingml/2006/main" xmlns:r="http://schemas.openxmlformats.org/officeDocument/2006/relationships" xmlns:p="http://schemas.openxmlformats.org/presentationml/2006/main">
+  <p:cSld>
+    <p:spTree>
+      <p:nvGrpSpPr>
+        <p:cNvPr id="1" name=""/>
+        <p:cNvGrpSpPr/>
+        <p:nvPr/>
+      </p:nvGrpSpPr>
+      <p:grpSpPr>
+        <a:xfrm>
+          <a:off x="0" y="0"/>
+          <a:ext cx="0" cy="0"/>
+          <a:chOff x="0" y="0"/>
+          <a:chExt cx="0" cy="0"/>
+        </a:xfrm>
+      </p:grpSpPr>
+      <p:sp>
+        <p:nvSpPr>
+          <p:cNvPr id="2" name="Title 1"/>
+          <p:cNvSpPr>
+            <a:spLocks noGrp="1"/>
+          </p:cNvSpPr>
+          <p:nvPr>
+            <p:ph type="ctrTitle"/>
+          </p:nvPr>
+        </p:nvSpPr>
+        <p:spPr>
+          <a:xfrm>
+            <a:off x="685800" y="160685"/>
+            <a:ext cx="7772400" cy="1470025"/>
+          </a:xfrm>
+        </p:spPr>
+        <p:txBody>
+          <a:bodyPr/>
+          <a:lstStyle/>
+          <a:p>
+            <a:pPr marL="457200" indent="-457200"/>
+            <a:r>
+              <a:rPr lang="en-US" dirty="0" smtClean="0"/>
+              <a:t>Process</a:t>
+            </a:r>
+            <a:endParaRPr lang="en-US" dirty="0"/>
+          </a:p>
+        </p:txBody>
+      </p:sp>
+      <p:sp>
+        <p:nvSpPr>
+          <p:cNvPr id="3" name="Subtitle 2"/>
+          <p:cNvSpPr>
+            <a:spLocks noGrp="1"/>
+          </p:cNvSpPr>
+          <p:nvPr>
+            <p:ph type="subTitle" idx="1"/>
+          </p:nvPr>
+        </p:nvSpPr>
+        <p:spPr>
+          <a:xfrm>
+            <a:off x="1371600" y="1630710"/>
+            <a:ext cx="6400800" cy="4609893"/>
+          </a:xfrm>
+        </p:spPr>
+        <p:txBody>
+          <a:bodyPr>
+            <a:normAutofit/>
+          </a:bodyPr>
+          <a:lstStyle/>
+          <a:p>
+            <a:pPr algn="l"/>
+            <a:r>
+              <a:rPr lang="en-US" dirty="0" err="1" smtClean="0"/>
+              <a:t>child_process</a:t>
+            </a:r>
+            <a:r>
+              <a:rPr lang="en-US" dirty="0" smtClean="0"/>
+              <a:t> </a:t>
+            </a:r>
+          </a:p>
+          <a:p>
+            <a:pPr marL="457200" indent="-457200" algn="l">
+              <a:buFont typeface="Arial"/>
+              <a:buChar char="•"/>
+            </a:pPr>
+            <a:r>
+              <a:rPr lang="en-US" dirty="0" smtClean="0"/>
+              <a:t>.exec – spawns a shell and runs command</a:t>
+            </a:r>
+          </a:p>
+          <a:p>
+            <a:pPr marL="457200" indent="-457200" algn="l">
+              <a:buFont typeface="Arial"/>
+              <a:buChar char="•"/>
+            </a:pPr>
+            <a:r>
+              <a:rPr lang="en-US" dirty="0" smtClean="0"/>
+              <a:t>.</a:t>
+            </a:r>
+            <a:r>
+              <a:rPr lang="en-US" dirty="0" err="1" smtClean="0"/>
+              <a:t>execFile</a:t>
+            </a:r>
+            <a:r>
+              <a:rPr lang="en-US" dirty="0" smtClean="0"/>
+              <a:t> – runs command as process</a:t>
+            </a:r>
+          </a:p>
+        </p:txBody>
+      </p:sp>
+    </p:spTree>
+    <p:extLst>
+      <p:ext uri="{BB962C8B-B14F-4D97-AF65-F5344CB8AC3E}">
+        <p14:creationId xmlns:p14="http://schemas.microsoft.com/office/powerpoint/2010/main" val="3683833179"/>
       </p:ext>
     </p:extLst>
   </p:cSld>
@@ -4297,6 +6466,211 @@
     <p:extLst>
       <p:ext uri="{BB962C8B-B14F-4D97-AF65-F5344CB8AC3E}">
         <p14:creationId xmlns:p14="http://schemas.microsoft.com/office/powerpoint/2010/main" val="1801260527"/>
+      </p:ext>
+    </p:extLst>
+  </p:cSld>
+  <p:clrMapOvr>
+    <a:masterClrMapping/>
+  </p:clrMapOvr>
+</p:sld>
+</file>
+
+<file path=ppt/slides/slide9.xml><?xml version="1.0" encoding="utf-8"?>
+<p:sld xmlns:a="http://schemas.openxmlformats.org/drawingml/2006/main" xmlns:r="http://schemas.openxmlformats.org/officeDocument/2006/relationships" xmlns:p="http://schemas.openxmlformats.org/presentationml/2006/main">
+  <p:cSld>
+    <p:spTree>
+      <p:nvGrpSpPr>
+        <p:cNvPr id="1" name=""/>
+        <p:cNvGrpSpPr/>
+        <p:nvPr/>
+      </p:nvGrpSpPr>
+      <p:grpSpPr>
+        <a:xfrm>
+          <a:off x="0" y="0"/>
+          <a:ext cx="0" cy="0"/>
+          <a:chOff x="0" y="0"/>
+          <a:chExt cx="0" cy="0"/>
+        </a:xfrm>
+      </p:grpSpPr>
+      <p:sp>
+        <p:nvSpPr>
+          <p:cNvPr id="2" name="Title 1"/>
+          <p:cNvSpPr>
+            <a:spLocks noGrp="1"/>
+          </p:cNvSpPr>
+          <p:nvPr>
+            <p:ph type="ctrTitle"/>
+          </p:nvPr>
+        </p:nvSpPr>
+        <p:spPr>
+          <a:xfrm>
+            <a:off x="685800" y="160685"/>
+            <a:ext cx="7772400" cy="1470025"/>
+          </a:xfrm>
+        </p:spPr>
+        <p:txBody>
+          <a:bodyPr/>
+          <a:lstStyle/>
+          <a:p>
+            <a:pPr marL="457200" indent="-457200"/>
+            <a:r>
+              <a:rPr lang="en-US" dirty="0" smtClean="0"/>
+              <a:t>Events lab</a:t>
+            </a:r>
+            <a:endParaRPr lang="en-US" dirty="0"/>
+          </a:p>
+        </p:txBody>
+      </p:sp>
+      <p:sp>
+        <p:nvSpPr>
+          <p:cNvPr id="3" name="Subtitle 2"/>
+          <p:cNvSpPr>
+            <a:spLocks noGrp="1"/>
+          </p:cNvSpPr>
+          <p:nvPr>
+            <p:ph type="subTitle" idx="1"/>
+          </p:nvPr>
+        </p:nvSpPr>
+        <p:spPr>
+          <a:xfrm>
+            <a:off x="1371600" y="1630710"/>
+            <a:ext cx="6400800" cy="4609893"/>
+          </a:xfrm>
+        </p:spPr>
+        <p:txBody>
+          <a:bodyPr>
+            <a:normAutofit fontScale="70000" lnSpcReduction="20000"/>
+          </a:bodyPr>
+          <a:lstStyle/>
+          <a:p>
+            <a:pPr algn="l"/>
+            <a:r>
+              <a:rPr lang="en-US" dirty="0" smtClean="0"/>
+              <a:t>Extend radio station example</a:t>
+            </a:r>
+          </a:p>
+          <a:p>
+            <a:pPr algn="l"/>
+            <a:r>
+              <a:rPr lang="en-US" dirty="0" smtClean="0"/>
+              <a:t>DJs</a:t>
+            </a:r>
+          </a:p>
+          <a:p>
+            <a:pPr marL="457200" indent="-457200" algn="l">
+              <a:buFont typeface="Arial"/>
+              <a:buChar char="•"/>
+            </a:pPr>
+            <a:r>
+              <a:rPr lang="en-US" dirty="0" smtClean="0"/>
+              <a:t>Play 10 songs per day </a:t>
+            </a:r>
+          </a:p>
+          <a:p>
+            <a:pPr marL="457200" indent="-457200" algn="l">
+              <a:buFont typeface="Arial"/>
+              <a:buChar char="•"/>
+            </a:pPr>
+            <a:r>
+              <a:rPr lang="en-US" dirty="0" smtClean="0"/>
+              <a:t>Anything from playlist</a:t>
+            </a:r>
+            <a:endParaRPr lang="en-US" dirty="0"/>
+          </a:p>
+          <a:p>
+            <a:pPr marL="457200" indent="-457200" algn="l">
+              <a:buFont typeface="Arial"/>
+              <a:buChar char="•"/>
+            </a:pPr>
+            <a:r>
+              <a:rPr lang="en-US" dirty="0" smtClean="0"/>
+              <a:t>Or other songs if they're requested enough</a:t>
+            </a:r>
+          </a:p>
+          <a:p>
+            <a:pPr marL="457200" indent="-457200" algn="l">
+              <a:buFont typeface="Arial"/>
+              <a:buChar char="•"/>
+            </a:pPr>
+            <a:r>
+              <a:rPr lang="en-US" dirty="0" smtClean="0"/>
+              <a:t>Play commercials</a:t>
+            </a:r>
+          </a:p>
+          <a:p>
+            <a:pPr algn="l"/>
+            <a:r>
+              <a:rPr lang="en-US" dirty="0" smtClean="0"/>
+              <a:t>Fans </a:t>
+            </a:r>
+          </a:p>
+          <a:p>
+            <a:pPr marL="457200" indent="-457200" algn="l">
+              <a:buFont typeface="Arial"/>
+              <a:buChar char="•"/>
+            </a:pPr>
+            <a:r>
+              <a:rPr lang="en-US" dirty="0" smtClean="0"/>
+              <a:t>Added randomly</a:t>
+            </a:r>
+          </a:p>
+          <a:p>
+            <a:pPr marL="457200" indent="-457200" algn="l">
+              <a:buFont typeface="Arial"/>
+              <a:buChar char="•"/>
+            </a:pPr>
+            <a:r>
+              <a:rPr lang="en-US" dirty="0" smtClean="0"/>
+              <a:t>Have a genre preference</a:t>
+            </a:r>
+          </a:p>
+          <a:p>
+            <a:pPr marL="457200" indent="-457200" algn="l">
+              <a:buFont typeface="Arial"/>
+              <a:buChar char="•"/>
+            </a:pPr>
+            <a:r>
+              <a:rPr lang="en-US" dirty="0" smtClean="0"/>
+              <a:t>Request their favorite songs</a:t>
+            </a:r>
+          </a:p>
+          <a:p>
+            <a:pPr marL="457200" indent="-457200" algn="l">
+              <a:buFont typeface="Arial"/>
+              <a:buChar char="•"/>
+            </a:pPr>
+            <a:r>
+              <a:rPr lang="en-US" dirty="0" smtClean="0"/>
+              <a:t>Leave if they don't hear enough music they like</a:t>
+            </a:r>
+          </a:p>
+          <a:p>
+            <a:pPr algn="l"/>
+            <a:r>
+              <a:rPr lang="en-US" dirty="0" smtClean="0"/>
+              <a:t>Advertisers</a:t>
+            </a:r>
+          </a:p>
+          <a:p>
+            <a:pPr marL="457200" indent="-457200" algn="l">
+              <a:buFont typeface="Arial"/>
+              <a:buChar char="•"/>
+            </a:pPr>
+            <a:r>
+              <a:rPr lang="en-US" dirty="0" smtClean="0"/>
+              <a:t>Pay based on # fans x # plays</a:t>
+            </a:r>
+          </a:p>
+          <a:p>
+            <a:pPr algn="l"/>
+            <a:endParaRPr lang="en-US" dirty="0" smtClean="0"/>
+          </a:p>
+        </p:txBody>
+      </p:sp>
+    </p:spTree>
+    <p:extLst>
+      <p:ext uri="{BB962C8B-B14F-4D97-AF65-F5344CB8AC3E}">
+        <p14:creationId xmlns:p14="http://schemas.microsoft.com/office/powerpoint/2010/main" val="2059266820"/>
       </p:ext>
     </p:extLst>
   </p:cSld>

</xml_diff>

<commit_message>
Slides: day 2 tweaks
</commit_message>
<xml_diff>
--- a/slides/Node Slides Day 2.pptx
+++ b/slides/Node Slides Day 2.pptx
@@ -19,8 +19,8 @@
     <p:sldId id="314" r:id="rId13"/>
     <p:sldId id="315" r:id="rId14"/>
     <p:sldId id="316" r:id="rId15"/>
-    <p:sldId id="312" r:id="rId16"/>
-    <p:sldId id="304" r:id="rId17"/>
+    <p:sldId id="317" r:id="rId16"/>
+    <p:sldId id="312" r:id="rId17"/>
     <p:sldId id="305" r:id="rId18"/>
     <p:sldId id="306" r:id="rId19"/>
     <p:sldId id="309" r:id="rId20"/>
@@ -28,6 +28,12 @@
     <p:sldId id="308" r:id="rId22"/>
     <p:sldId id="310" r:id="rId23"/>
     <p:sldId id="311" r:id="rId24"/>
+    <p:sldId id="319" r:id="rId25"/>
+    <p:sldId id="318" r:id="rId26"/>
+    <p:sldId id="320" r:id="rId27"/>
+    <p:sldId id="321" r:id="rId28"/>
+    <p:sldId id="322" r:id="rId29"/>
+    <p:sldId id="323" r:id="rId30"/>
   </p:sldIdLst>
   <p:sldSz cx="9144000" cy="6858000" type="screen4x3"/>
   <p:notesSz cx="6858000" cy="9144000"/>
@@ -310,7 +316,7 @@
           <a:p>
             <a:fld id="{6BFECD78-3C8E-49F2-8FAB-59489D168ABB}" type="datetimeFigureOut">
               <a:rPr lang="en-US" smtClean="0"/>
-              <a:t>11/6/16</a:t>
+              <a:t>11/16/16</a:t>
             </a:fld>
             <a:endParaRPr lang="en-US"/>
           </a:p>
@@ -480,7 +486,7 @@
           <a:p>
             <a:fld id="{6BFECD78-3C8E-49F2-8FAB-59489D168ABB}" type="datetimeFigureOut">
               <a:rPr lang="en-US" smtClean="0"/>
-              <a:t>11/6/16</a:t>
+              <a:t>11/16/16</a:t>
             </a:fld>
             <a:endParaRPr lang="en-US"/>
           </a:p>
@@ -660,7 +666,7 @@
           <a:p>
             <a:fld id="{6BFECD78-3C8E-49F2-8FAB-59489D168ABB}" type="datetimeFigureOut">
               <a:rPr lang="en-US" smtClean="0"/>
-              <a:t>11/6/16</a:t>
+              <a:t>11/16/16</a:t>
             </a:fld>
             <a:endParaRPr lang="en-US"/>
           </a:p>
@@ -830,7 +836,7 @@
           <a:p>
             <a:fld id="{6BFECD78-3C8E-49F2-8FAB-59489D168ABB}" type="datetimeFigureOut">
               <a:rPr lang="en-US" smtClean="0"/>
-              <a:t>11/6/16</a:t>
+              <a:t>11/16/16</a:t>
             </a:fld>
             <a:endParaRPr lang="en-US"/>
           </a:p>
@@ -1076,7 +1082,7 @@
           <a:p>
             <a:fld id="{6BFECD78-3C8E-49F2-8FAB-59489D168ABB}" type="datetimeFigureOut">
               <a:rPr lang="en-US" smtClean="0"/>
-              <a:t>11/6/16</a:t>
+              <a:t>11/16/16</a:t>
             </a:fld>
             <a:endParaRPr lang="en-US"/>
           </a:p>
@@ -1364,7 +1370,7 @@
           <a:p>
             <a:fld id="{6BFECD78-3C8E-49F2-8FAB-59489D168ABB}" type="datetimeFigureOut">
               <a:rPr lang="en-US" smtClean="0"/>
-              <a:t>11/6/16</a:t>
+              <a:t>11/16/16</a:t>
             </a:fld>
             <a:endParaRPr lang="en-US"/>
           </a:p>
@@ -1786,7 +1792,7 @@
           <a:p>
             <a:fld id="{6BFECD78-3C8E-49F2-8FAB-59489D168ABB}" type="datetimeFigureOut">
               <a:rPr lang="en-US" smtClean="0"/>
-              <a:t>11/6/16</a:t>
+              <a:t>11/16/16</a:t>
             </a:fld>
             <a:endParaRPr lang="en-US"/>
           </a:p>
@@ -1904,7 +1910,7 @@
           <a:p>
             <a:fld id="{6BFECD78-3C8E-49F2-8FAB-59489D168ABB}" type="datetimeFigureOut">
               <a:rPr lang="en-US" smtClean="0"/>
-              <a:t>11/6/16</a:t>
+              <a:t>11/16/16</a:t>
             </a:fld>
             <a:endParaRPr lang="en-US"/>
           </a:p>
@@ -1999,7 +2005,7 @@
           <a:p>
             <a:fld id="{6BFECD78-3C8E-49F2-8FAB-59489D168ABB}" type="datetimeFigureOut">
               <a:rPr lang="en-US" smtClean="0"/>
-              <a:t>11/6/16</a:t>
+              <a:t>11/16/16</a:t>
             </a:fld>
             <a:endParaRPr lang="en-US"/>
           </a:p>
@@ -2276,7 +2282,7 @@
           <a:p>
             <a:fld id="{6BFECD78-3C8E-49F2-8FAB-59489D168ABB}" type="datetimeFigureOut">
               <a:rPr lang="en-US" smtClean="0"/>
-              <a:t>11/6/16</a:t>
+              <a:t>11/16/16</a:t>
             </a:fld>
             <a:endParaRPr lang="en-US"/>
           </a:p>
@@ -2533,7 +2539,7 @@
           <a:p>
             <a:fld id="{6BFECD78-3C8E-49F2-8FAB-59489D168ABB}" type="datetimeFigureOut">
               <a:rPr lang="en-US" smtClean="0"/>
-              <a:t>11/6/16</a:t>
+              <a:t>11/16/16</a:t>
             </a:fld>
             <a:endParaRPr lang="en-US"/>
           </a:p>
@@ -2746,7 +2752,7 @@
           <a:p>
             <a:fld id="{6BFECD78-3C8E-49F2-8FAB-59489D168ABB}" type="datetimeFigureOut">
               <a:rPr lang="en-US" smtClean="0"/>
-              <a:t>11/6/16</a:t>
+              <a:t>11/16/16</a:t>
             </a:fld>
             <a:endParaRPr lang="en-US"/>
           </a:p>
@@ -3142,11 +3148,7 @@
             </a:r>
             <a:r>
               <a:rPr lang="en-US" dirty="0" smtClean="0"/>
-              <a:t> </a:t>
-            </a:r>
-            <a:r>
-              <a:rPr lang="en-US" dirty="0" smtClean="0"/>
-              <a:t>training</a:t>
+              <a:t> training</a:t>
             </a:r>
             <a:r>
               <a:rPr lang="en-US" dirty="0"/>
@@ -3157,11 +3159,7 @@
             </a:br>
             <a:r>
               <a:rPr lang="en-US" dirty="0" smtClean="0"/>
-              <a:t>Day </a:t>
-            </a:r>
-            <a:r>
-              <a:rPr lang="en-US" dirty="0" smtClean="0"/>
-              <a:t>2</a:t>
+              <a:t>Day 2</a:t>
             </a:r>
             <a:endParaRPr lang="en-US" dirty="0"/>
           </a:p>
@@ -3521,25 +3519,13 @@
             </a:pPr>
             <a:r>
               <a:rPr lang="en-US" dirty="0" smtClean="0"/>
-              <a:t>(data is never lost)</a:t>
-            </a:r>
-          </a:p>
-          <a:p>
-            <a:pPr marL="457200" indent="-457200" algn="l">
-              <a:buFont typeface="Arial"/>
-              <a:buChar char="•"/>
-            </a:pPr>
-            <a:r>
-              <a:rPr lang="en-US" dirty="0" smtClean="0"/>
-              <a:t>.pipe( writeable ) for convenience</a:t>
-            </a:r>
-          </a:p>
-          <a:p>
-            <a:pPr marL="457200" indent="-457200" algn="l">
-              <a:buFont typeface="Arial"/>
-              <a:buChar char="•"/>
-            </a:pPr>
-            <a:endParaRPr lang="en-US" dirty="0"/>
+              <a:t>(data is never lost</a:t>
+            </a:r>
+            <a:r>
+              <a:rPr lang="en-US" dirty="0" smtClean="0"/>
+              <a:t>)</a:t>
+            </a:r>
+            <a:endParaRPr lang="en-US" dirty="0" smtClean="0"/>
           </a:p>
         </p:txBody>
       </p:sp>
@@ -3669,7 +3655,15 @@
             </a:pPr>
             <a:r>
               <a:rPr lang="en-US" dirty="0" smtClean="0"/>
-              <a:t>If false, you need to handle </a:t>
+              <a:t>If false, you </a:t>
+            </a:r>
+            <a:r>
+              <a:rPr lang="en-US" dirty="0" smtClean="0"/>
+              <a:t>should </a:t>
+            </a:r>
+            <a:r>
+              <a:rPr lang="en-US" dirty="0" smtClean="0"/>
+              <a:t>handle </a:t>
             </a:r>
           </a:p>
           <a:p>
@@ -4072,7 +4066,7 @@
             <a:pPr marL="457200" indent="-457200"/>
             <a:r>
               <a:rPr lang="en-US" dirty="0" smtClean="0"/>
-              <a:t>Process</a:t>
+              <a:t>Streams Examples</a:t>
             </a:r>
             <a:endParaRPr lang="en-US" dirty="0"/>
           </a:p>
@@ -4105,48 +4099,65 @@
               <a:buChar char="•"/>
             </a:pPr>
             <a:r>
-              <a:rPr lang="en-US" dirty="0" smtClean="0"/>
-              <a:t>Global – no require() needed</a:t>
-            </a:r>
-          </a:p>
-          <a:p>
-            <a:pPr marL="457200" indent="-457200" algn="l">
-              <a:buFont typeface="Arial"/>
-              <a:buChar char="•"/>
-            </a:pPr>
-            <a:r>
-              <a:rPr lang="en-US" dirty="0" smtClean="0"/>
-              <a:t>Represents OS process</a:t>
-            </a:r>
-          </a:p>
-          <a:p>
-            <a:pPr marL="914400" lvl="1" indent="-457200" algn="l">
-              <a:buFont typeface="Arial"/>
-              <a:buChar char="•"/>
-            </a:pPr>
-            <a:r>
-              <a:rPr lang="en-US" dirty="0" smtClean="0"/>
-              <a:t>Info about </a:t>
-            </a:r>
-          </a:p>
-          <a:p>
-            <a:pPr marL="914400" lvl="1" indent="-457200" algn="l">
-              <a:buFont typeface="Arial"/>
-              <a:buChar char="•"/>
-            </a:pPr>
-            <a:r>
-              <a:rPr lang="en-US" dirty="0" smtClean="0"/>
-              <a:t>Control over</a:t>
-            </a:r>
-          </a:p>
-          <a:p>
-            <a:pPr marL="457200" indent="-457200" algn="l">
-              <a:buFont typeface="Arial"/>
-              <a:buChar char="•"/>
-            </a:pPr>
+              <a:rPr lang="en-US" dirty="0"/>
+              <a:t>streams-</a:t>
+            </a:r>
+            <a:r>
+              <a:rPr lang="en-US" dirty="0" err="1"/>
+              <a:t>stdin</a:t>
+            </a:r>
+            <a:r>
+              <a:rPr lang="en-US" dirty="0"/>
+              <a:t>-</a:t>
+            </a:r>
             <a:r>
               <a:rPr lang="en-US" dirty="0" err="1" smtClean="0"/>
-              <a:t>EventEmitter</a:t>
+              <a:t>stdout.js</a:t>
+            </a:r>
+            <a:endParaRPr lang="en-US" dirty="0" smtClean="0"/>
+          </a:p>
+          <a:p>
+            <a:pPr marL="457200" indent="-457200" algn="l">
+              <a:buFont typeface="Arial"/>
+              <a:buChar char="•"/>
+            </a:pPr>
+            <a:r>
+              <a:rPr lang="en-US" dirty="0"/>
+              <a:t>streams-consume-custom-</a:t>
+            </a:r>
+            <a:r>
+              <a:rPr lang="en-US" dirty="0" err="1" smtClean="0"/>
+              <a:t>readable.js</a:t>
+            </a:r>
+            <a:endParaRPr lang="en-US" dirty="0" smtClean="0"/>
+          </a:p>
+          <a:p>
+            <a:pPr marL="457200" indent="-457200" algn="l">
+              <a:buFont typeface="Arial"/>
+              <a:buChar char="•"/>
+            </a:pPr>
+            <a:r>
+              <a:rPr lang="en-US" dirty="0"/>
+              <a:t>streams-custom-</a:t>
+            </a:r>
+            <a:r>
+              <a:rPr lang="en-US" dirty="0" err="1" smtClean="0"/>
+              <a:t>http.js</a:t>
+            </a:r>
+            <a:endParaRPr lang="en-US" dirty="0" smtClean="0"/>
+          </a:p>
+          <a:p>
+            <a:pPr marL="457200" indent="-457200" algn="l">
+              <a:buFont typeface="Arial"/>
+              <a:buChar char="•"/>
+            </a:pPr>
+            <a:r>
+              <a:rPr lang="en-US" dirty="0"/>
+              <a:t>streams-</a:t>
+            </a:r>
+            <a:r>
+              <a:rPr lang="en-US" dirty="0" err="1"/>
+              <a:t>transform.js</a:t>
             </a:r>
             <a:endParaRPr lang="en-US" dirty="0"/>
           </a:p>
@@ -4155,7 +4166,7 @@
     </p:spTree>
     <p:extLst>
       <p:ext uri="{BB962C8B-B14F-4D97-AF65-F5344CB8AC3E}">
-        <p14:creationId xmlns:p14="http://schemas.microsoft.com/office/powerpoint/2010/main" val="2133600796"/>
+        <p14:creationId xmlns:p14="http://schemas.microsoft.com/office/powerpoint/2010/main" val="3415725525"/>
       </p:ext>
     </p:extLst>
   </p:cSld>
@@ -4233,13 +4244,6 @@
           </a:bodyPr>
           <a:lstStyle/>
           <a:p>
-            <a:pPr algn="l"/>
-            <a:r>
-              <a:rPr lang="en-US" dirty="0" smtClean="0"/>
-              <a:t>Info </a:t>
-            </a:r>
-          </a:p>
-          <a:p>
             <a:pPr marL="457200" indent="-457200" algn="l">
               <a:buFont typeface="Arial"/>
               <a:buChar char="•"/>
@@ -4295,7 +4299,7 @@
     </p:spTree>
     <p:extLst>
       <p:ext uri="{BB962C8B-B14F-4D97-AF65-F5344CB8AC3E}">
-        <p14:creationId xmlns:p14="http://schemas.microsoft.com/office/powerpoint/2010/main" val="2435394911"/>
+        <p14:creationId xmlns:p14="http://schemas.microsoft.com/office/powerpoint/2010/main" val="2133600796"/>
       </p:ext>
     </p:extLst>
   </p:cSld>
@@ -4627,7 +4631,11 @@
             </a:pPr>
             <a:r>
               <a:rPr lang="en-US" dirty="0" smtClean="0"/>
-              <a:t>Throw an Error </a:t>
+              <a:t>Instead, throw a native </a:t>
+            </a:r>
+            <a:r>
+              <a:rPr lang="en-US" dirty="0" smtClean="0"/>
+              <a:t>Error </a:t>
             </a:r>
           </a:p>
           <a:p>
@@ -4637,8 +4645,13 @@
             </a:pPr>
             <a:r>
               <a:rPr lang="en-US" dirty="0" smtClean="0"/>
-              <a:t>Emit 'error'</a:t>
-            </a:r>
+              <a:t>Emit 'error</a:t>
+            </a:r>
+            <a:r>
+              <a:rPr lang="en-US" dirty="0" smtClean="0"/>
+              <a:t>' event</a:t>
+            </a:r>
+            <a:endParaRPr lang="en-US" dirty="0" smtClean="0"/>
           </a:p>
           <a:p>
             <a:pPr marL="914400" lvl="1" indent="-457200" algn="l">
@@ -4850,15 +4863,7 @@
           <a:p>
             <a:r>
               <a:rPr lang="en-US" dirty="0" smtClean="0"/>
-              <a:t>Day </a:t>
-            </a:r>
-            <a:r>
-              <a:rPr lang="en-US" dirty="0" smtClean="0"/>
-              <a:t>2 </a:t>
-            </a:r>
-            <a:r>
-              <a:rPr lang="en-US" dirty="0" smtClean="0"/>
-              <a:t>Schedule</a:t>
+              <a:t>Day 2 Schedule</a:t>
             </a:r>
             <a:endParaRPr lang="en-US" dirty="0"/>
           </a:p>
@@ -4910,8 +4915,13 @@
             </a:pPr>
             <a:r>
               <a:rPr lang="en-US" dirty="0" smtClean="0"/>
-              <a:t>Event listeners</a:t>
-            </a:r>
+              <a:t>Event </a:t>
+            </a:r>
+            <a:r>
+              <a:rPr lang="en-US" dirty="0" smtClean="0"/>
+              <a:t>listeners</a:t>
+            </a:r>
+            <a:endParaRPr lang="en-US" dirty="0" smtClean="0"/>
           </a:p>
           <a:p>
             <a:pPr marL="914400" lvl="1" indent="-457200" algn="l">
@@ -4920,33 +4930,23 @@
             </a:pPr>
             <a:r>
               <a:rPr lang="en-US" dirty="0" smtClean="0"/>
+              <a:t>Streams and </a:t>
+            </a:r>
+            <a:r>
+              <a:rPr lang="en-US" dirty="0" smtClean="0"/>
+              <a:t>buffers</a:t>
+            </a:r>
+          </a:p>
+          <a:p>
+            <a:pPr marL="914400" lvl="1" indent="-457200" algn="l">
+              <a:buFont typeface="Arial"/>
+              <a:buChar char="•"/>
+            </a:pPr>
+            <a:r>
+              <a:rPr lang="en-US" dirty="0"/>
               <a:t>Process</a:t>
             </a:r>
-          </a:p>
-          <a:p>
-            <a:pPr marL="914400" lvl="1" indent="-457200" algn="l">
-              <a:buFont typeface="Arial"/>
-              <a:buChar char="•"/>
-            </a:pPr>
-            <a:r>
-              <a:rPr lang="en-US" dirty="0" smtClean="0"/>
-              <a:t>Streams and buffers</a:t>
-            </a:r>
-          </a:p>
-          <a:p>
-            <a:pPr marL="914400" lvl="1" indent="-457200" algn="l">
-              <a:buFont typeface="Arial"/>
-              <a:buChar char="•"/>
-            </a:pPr>
-            <a:r>
-              <a:rPr lang="en-US" dirty="0" err="1" smtClean="0"/>
-              <a:t>Async</a:t>
-            </a:r>
-            <a:r>
-              <a:rPr lang="en-US" dirty="0" smtClean="0"/>
-              <a:t> programming</a:t>
-            </a:r>
-            <a:endParaRPr lang="en-US" dirty="0"/>
+            <a:endParaRPr lang="en-US" dirty="0" smtClean="0"/>
           </a:p>
           <a:p>
             <a:pPr marL="457200" indent="-457200" algn="l">
@@ -4987,7 +4987,29 @@
             </a:pPr>
             <a:r>
               <a:rPr lang="en-US" dirty="0" smtClean="0"/>
-              <a:t>Mongo and Oracle</a:t>
+              <a:t>Mongo and </a:t>
+            </a:r>
+            <a:r>
+              <a:rPr lang="en-US" dirty="0" smtClean="0"/>
+              <a:t>Oracle</a:t>
+            </a:r>
+          </a:p>
+          <a:p>
+            <a:pPr marL="914400" lvl="1" indent="-457200" algn="l">
+              <a:buFont typeface="Arial"/>
+              <a:buChar char="•"/>
+            </a:pPr>
+            <a:r>
+              <a:rPr lang="en-US" dirty="0" err="1"/>
+              <a:t>Async</a:t>
+            </a:r>
+            <a:r>
+              <a:rPr lang="en-US" dirty="0"/>
+              <a:t> </a:t>
+            </a:r>
+            <a:r>
+              <a:rPr lang="en-US" dirty="0" smtClean="0"/>
+              <a:t>programming</a:t>
             </a:r>
             <a:endParaRPr lang="en-US" dirty="0"/>
           </a:p>
@@ -5554,8 +5576,23 @@
             </a:r>
             <a:r>
               <a:rPr lang="en-US" dirty="0" smtClean="0"/>
-              <a:t> – runs command as process</a:t>
-            </a:r>
+              <a:t> – runs command as </a:t>
+            </a:r>
+            <a:r>
+              <a:rPr lang="en-US" dirty="0" smtClean="0"/>
+              <a:t>process</a:t>
+            </a:r>
+          </a:p>
+          <a:p>
+            <a:pPr marL="457200" indent="-457200" algn="l">
+              <a:buFont typeface="Arial"/>
+              <a:buChar char="•"/>
+            </a:pPr>
+            <a:r>
+              <a:rPr lang="en-US" dirty="0" smtClean="0"/>
+              <a:t>Many more</a:t>
+            </a:r>
+            <a:endParaRPr lang="en-US" dirty="0" smtClean="0"/>
           </a:p>
         </p:txBody>
       </p:sp>
@@ -5563,6 +5600,899 @@
     <p:extLst>
       <p:ext uri="{BB962C8B-B14F-4D97-AF65-F5344CB8AC3E}">
         <p14:creationId xmlns:p14="http://schemas.microsoft.com/office/powerpoint/2010/main" val="3683833179"/>
+      </p:ext>
+    </p:extLst>
+  </p:cSld>
+  <p:clrMapOvr>
+    <a:masterClrMapping/>
+  </p:clrMapOvr>
+</p:sld>
+</file>
+
+<file path=ppt/slides/slide24.xml><?xml version="1.0" encoding="utf-8"?>
+<p:sld xmlns:a="http://schemas.openxmlformats.org/drawingml/2006/main" xmlns:r="http://schemas.openxmlformats.org/officeDocument/2006/relationships" xmlns:p="http://schemas.openxmlformats.org/presentationml/2006/main">
+  <p:cSld>
+    <p:spTree>
+      <p:nvGrpSpPr>
+        <p:cNvPr id="1" name=""/>
+        <p:cNvGrpSpPr/>
+        <p:nvPr/>
+      </p:nvGrpSpPr>
+      <p:grpSpPr>
+        <a:xfrm>
+          <a:off x="0" y="0"/>
+          <a:ext cx="0" cy="0"/>
+          <a:chOff x="0" y="0"/>
+          <a:chExt cx="0" cy="0"/>
+        </a:xfrm>
+      </p:grpSpPr>
+      <p:sp>
+        <p:nvSpPr>
+          <p:cNvPr id="2" name="Title 1"/>
+          <p:cNvSpPr>
+            <a:spLocks noGrp="1"/>
+          </p:cNvSpPr>
+          <p:nvPr>
+            <p:ph type="ctrTitle"/>
+          </p:nvPr>
+        </p:nvSpPr>
+        <p:spPr>
+          <a:xfrm>
+            <a:off x="685800" y="160685"/>
+            <a:ext cx="7772400" cy="1470025"/>
+          </a:xfrm>
+        </p:spPr>
+        <p:txBody>
+          <a:bodyPr/>
+          <a:lstStyle/>
+          <a:p>
+            <a:pPr marL="457200" indent="-457200"/>
+            <a:r>
+              <a:rPr lang="en-US" dirty="0" err="1" smtClean="0"/>
+              <a:t>Filesystem</a:t>
+            </a:r>
+            <a:endParaRPr lang="en-US" dirty="0"/>
+          </a:p>
+        </p:txBody>
+      </p:sp>
+      <p:sp>
+        <p:nvSpPr>
+          <p:cNvPr id="3" name="Subtitle 2"/>
+          <p:cNvSpPr>
+            <a:spLocks noGrp="1"/>
+          </p:cNvSpPr>
+          <p:nvPr>
+            <p:ph type="subTitle" idx="1"/>
+          </p:nvPr>
+        </p:nvSpPr>
+        <p:spPr>
+          <a:xfrm>
+            <a:off x="1371600" y="1630710"/>
+            <a:ext cx="6400800" cy="4609893"/>
+          </a:xfrm>
+        </p:spPr>
+        <p:txBody>
+          <a:bodyPr>
+            <a:normAutofit lnSpcReduction="10000"/>
+          </a:bodyPr>
+          <a:lstStyle/>
+          <a:p>
+            <a:pPr marL="457200" indent="-457200" algn="l">
+              <a:buFont typeface="Arial"/>
+              <a:buChar char="•"/>
+            </a:pPr>
+            <a:r>
+              <a:rPr lang="en-US" dirty="0" smtClean="0"/>
+              <a:t>Thin API around system calls</a:t>
+            </a:r>
+            <a:endParaRPr lang="en-US" dirty="0" smtClean="0"/>
+          </a:p>
+          <a:p>
+            <a:pPr marL="457200" indent="-457200" algn="l">
+              <a:buFont typeface="Arial"/>
+              <a:buChar char="•"/>
+            </a:pPr>
+            <a:r>
+              <a:rPr lang="en-US" dirty="0" smtClean="0"/>
+              <a:t>Sync &amp; </a:t>
+            </a:r>
+            <a:r>
+              <a:rPr lang="en-US" dirty="0" err="1" smtClean="0"/>
+              <a:t>async</a:t>
+            </a:r>
+            <a:r>
+              <a:rPr lang="en-US" dirty="0" smtClean="0"/>
+              <a:t> versions</a:t>
+            </a:r>
+          </a:p>
+          <a:p>
+            <a:pPr marL="914400" lvl="1" indent="-457200" algn="l">
+              <a:buFont typeface="Arial"/>
+              <a:buChar char="•"/>
+            </a:pPr>
+            <a:r>
+              <a:rPr lang="en-US" dirty="0" smtClean="0"/>
+              <a:t>Sync throws errors</a:t>
+            </a:r>
+          </a:p>
+          <a:p>
+            <a:pPr marL="914400" lvl="1" indent="-457200" algn="l">
+              <a:buFont typeface="Arial"/>
+              <a:buChar char="•"/>
+            </a:pPr>
+            <a:r>
+              <a:rPr lang="en-US" dirty="0" err="1" smtClean="0"/>
+              <a:t>Async</a:t>
+            </a:r>
+            <a:r>
+              <a:rPr lang="en-US" dirty="0" smtClean="0"/>
+              <a:t> passes errors to callback</a:t>
+            </a:r>
+          </a:p>
+          <a:p>
+            <a:pPr marL="457200" indent="-457200" algn="l">
+              <a:buFont typeface="Arial"/>
+              <a:buChar char="•"/>
+            </a:pPr>
+            <a:r>
+              <a:rPr lang="en-US" dirty="0" err="1" smtClean="0"/>
+              <a:t>Async</a:t>
+            </a:r>
+            <a:r>
+              <a:rPr lang="en-US" dirty="0" smtClean="0"/>
+              <a:t> logic</a:t>
+            </a:r>
+          </a:p>
+          <a:p>
+            <a:pPr marL="914400" lvl="1" indent="-457200" algn="l">
+              <a:buFont typeface="Arial"/>
+              <a:buChar char="•"/>
+            </a:pPr>
+            <a:r>
+              <a:rPr lang="en-US" dirty="0" smtClean="0"/>
+              <a:t>Dependent callbacks must be nested</a:t>
+            </a:r>
+          </a:p>
+          <a:p>
+            <a:pPr marL="914400" lvl="1" indent="-457200" algn="l">
+              <a:buFont typeface="Arial"/>
+              <a:buChar char="•"/>
+            </a:pPr>
+            <a:r>
+              <a:rPr lang="en-US" dirty="0" smtClean="0"/>
+              <a:t>This is Not Great</a:t>
+            </a:r>
+          </a:p>
+          <a:p>
+            <a:pPr marL="914400" lvl="1" indent="-457200" algn="l">
+              <a:buFont typeface="Arial"/>
+              <a:buChar char="•"/>
+            </a:pPr>
+            <a:r>
+              <a:rPr lang="en-US" dirty="0" smtClean="0"/>
+              <a:t>We'll see solutions next</a:t>
+            </a:r>
+          </a:p>
+          <a:p>
+            <a:pPr marL="457200" indent="-457200" algn="l">
+              <a:buFont typeface="Arial"/>
+              <a:buChar char="•"/>
+            </a:pPr>
+            <a:r>
+              <a:rPr lang="en-US" dirty="0"/>
+              <a:t>streams-</a:t>
+            </a:r>
+            <a:r>
+              <a:rPr lang="en-US" dirty="0" err="1"/>
+              <a:t>filesystem.js</a:t>
+            </a:r>
+            <a:endParaRPr lang="en-US" dirty="0" smtClean="0"/>
+          </a:p>
+          <a:p>
+            <a:pPr algn="l"/>
+            <a:endParaRPr lang="en-US" dirty="0" smtClean="0"/>
+          </a:p>
+        </p:txBody>
+      </p:sp>
+    </p:spTree>
+    <p:extLst>
+      <p:ext uri="{BB962C8B-B14F-4D97-AF65-F5344CB8AC3E}">
+        <p14:creationId xmlns:p14="http://schemas.microsoft.com/office/powerpoint/2010/main" val="3578114323"/>
+      </p:ext>
+    </p:extLst>
+  </p:cSld>
+  <p:clrMapOvr>
+    <a:masterClrMapping/>
+  </p:clrMapOvr>
+</p:sld>
+</file>
+
+<file path=ppt/slides/slide25.xml><?xml version="1.0" encoding="utf-8"?>
+<p:sld xmlns:a="http://schemas.openxmlformats.org/drawingml/2006/main" xmlns:r="http://schemas.openxmlformats.org/officeDocument/2006/relationships" xmlns:p="http://schemas.openxmlformats.org/presentationml/2006/main">
+  <p:cSld>
+    <p:spTree>
+      <p:nvGrpSpPr>
+        <p:cNvPr id="1" name=""/>
+        <p:cNvGrpSpPr/>
+        <p:nvPr/>
+      </p:nvGrpSpPr>
+      <p:grpSpPr>
+        <a:xfrm>
+          <a:off x="0" y="0"/>
+          <a:ext cx="0" cy="0"/>
+          <a:chOff x="0" y="0"/>
+          <a:chExt cx="0" cy="0"/>
+        </a:xfrm>
+      </p:grpSpPr>
+      <p:sp>
+        <p:nvSpPr>
+          <p:cNvPr id="2" name="Title 1"/>
+          <p:cNvSpPr>
+            <a:spLocks noGrp="1"/>
+          </p:cNvSpPr>
+          <p:nvPr>
+            <p:ph type="ctrTitle"/>
+          </p:nvPr>
+        </p:nvSpPr>
+        <p:spPr>
+          <a:xfrm>
+            <a:off x="685800" y="160685"/>
+            <a:ext cx="7772400" cy="1470025"/>
+          </a:xfrm>
+        </p:spPr>
+        <p:txBody>
+          <a:bodyPr/>
+          <a:lstStyle/>
+          <a:p>
+            <a:pPr marL="457200" indent="-457200"/>
+            <a:r>
+              <a:rPr lang="en-US" dirty="0" err="1" smtClean="0"/>
+              <a:t>Async</a:t>
+            </a:r>
+            <a:r>
+              <a:rPr lang="en-US" dirty="0" smtClean="0"/>
+              <a:t> solutions</a:t>
+            </a:r>
+            <a:endParaRPr lang="en-US" dirty="0"/>
+          </a:p>
+        </p:txBody>
+      </p:sp>
+      <p:sp>
+        <p:nvSpPr>
+          <p:cNvPr id="3" name="Subtitle 2"/>
+          <p:cNvSpPr>
+            <a:spLocks noGrp="1"/>
+          </p:cNvSpPr>
+          <p:nvPr>
+            <p:ph type="subTitle" idx="1"/>
+          </p:nvPr>
+        </p:nvSpPr>
+        <p:spPr>
+          <a:xfrm>
+            <a:off x="1371600" y="1630710"/>
+            <a:ext cx="6400800" cy="4609893"/>
+          </a:xfrm>
+        </p:spPr>
+        <p:txBody>
+          <a:bodyPr>
+            <a:normAutofit/>
+          </a:bodyPr>
+          <a:lstStyle/>
+          <a:p>
+            <a:pPr marL="457200" indent="-457200" algn="l">
+              <a:buFont typeface="Arial"/>
+              <a:buChar char="•"/>
+            </a:pPr>
+            <a:r>
+              <a:rPr lang="en-US" dirty="0" smtClean="0"/>
+              <a:t>Nested callback pattern gets old</a:t>
+            </a:r>
+          </a:p>
+          <a:p>
+            <a:pPr marL="457200" indent="-457200" algn="l">
+              <a:buFont typeface="Arial"/>
+              <a:buChar char="•"/>
+            </a:pPr>
+            <a:r>
+              <a:rPr lang="en-US" dirty="0" smtClean="0"/>
+              <a:t>Hard to read/understand</a:t>
+            </a:r>
+          </a:p>
+          <a:p>
+            <a:pPr marL="457200" indent="-457200" algn="l">
+              <a:buFont typeface="Arial"/>
+              <a:buChar char="•"/>
+            </a:pPr>
+            <a:r>
+              <a:rPr lang="en-US" dirty="0" smtClean="0"/>
+              <a:t>Inflexible, not reusable</a:t>
+            </a:r>
+          </a:p>
+          <a:p>
+            <a:pPr algn="l"/>
+            <a:endParaRPr lang="en-US" dirty="0" smtClean="0"/>
+          </a:p>
+        </p:txBody>
+      </p:sp>
+    </p:spTree>
+    <p:extLst>
+      <p:ext uri="{BB962C8B-B14F-4D97-AF65-F5344CB8AC3E}">
+        <p14:creationId xmlns:p14="http://schemas.microsoft.com/office/powerpoint/2010/main" val="692596547"/>
+      </p:ext>
+    </p:extLst>
+  </p:cSld>
+  <p:clrMapOvr>
+    <a:masterClrMapping/>
+  </p:clrMapOvr>
+</p:sld>
+</file>
+
+<file path=ppt/slides/slide26.xml><?xml version="1.0" encoding="utf-8"?>
+<p:sld xmlns:a="http://schemas.openxmlformats.org/drawingml/2006/main" xmlns:r="http://schemas.openxmlformats.org/officeDocument/2006/relationships" xmlns:p="http://schemas.openxmlformats.org/presentationml/2006/main">
+  <p:cSld>
+    <p:spTree>
+      <p:nvGrpSpPr>
+        <p:cNvPr id="1" name=""/>
+        <p:cNvGrpSpPr/>
+        <p:nvPr/>
+      </p:nvGrpSpPr>
+      <p:grpSpPr>
+        <a:xfrm>
+          <a:off x="0" y="0"/>
+          <a:ext cx="0" cy="0"/>
+          <a:chOff x="0" y="0"/>
+          <a:chExt cx="0" cy="0"/>
+        </a:xfrm>
+      </p:grpSpPr>
+      <p:sp>
+        <p:nvSpPr>
+          <p:cNvPr id="2" name="Title 1"/>
+          <p:cNvSpPr>
+            <a:spLocks noGrp="1"/>
+          </p:cNvSpPr>
+          <p:nvPr>
+            <p:ph type="ctrTitle"/>
+          </p:nvPr>
+        </p:nvSpPr>
+        <p:spPr>
+          <a:xfrm>
+            <a:off x="685800" y="160685"/>
+            <a:ext cx="7772400" cy="1470025"/>
+          </a:xfrm>
+        </p:spPr>
+        <p:txBody>
+          <a:bodyPr/>
+          <a:lstStyle/>
+          <a:p>
+            <a:pPr marL="457200" indent="-457200"/>
+            <a:r>
+              <a:rPr lang="en-US" dirty="0" err="1" smtClean="0"/>
+              <a:t>Async</a:t>
+            </a:r>
+            <a:r>
+              <a:rPr lang="en-US" dirty="0" smtClean="0"/>
+              <a:t> solutions</a:t>
+            </a:r>
+            <a:endParaRPr lang="en-US" dirty="0"/>
+          </a:p>
+        </p:txBody>
+      </p:sp>
+      <p:sp>
+        <p:nvSpPr>
+          <p:cNvPr id="3" name="Subtitle 2"/>
+          <p:cNvSpPr>
+            <a:spLocks noGrp="1"/>
+          </p:cNvSpPr>
+          <p:nvPr>
+            <p:ph type="subTitle" idx="1"/>
+          </p:nvPr>
+        </p:nvSpPr>
+        <p:spPr>
+          <a:xfrm>
+            <a:off x="1371600" y="1630710"/>
+            <a:ext cx="6400800" cy="4609893"/>
+          </a:xfrm>
+        </p:spPr>
+        <p:txBody>
+          <a:bodyPr>
+            <a:normAutofit/>
+          </a:bodyPr>
+          <a:lstStyle/>
+          <a:p>
+            <a:pPr algn="l"/>
+            <a:r>
+              <a:rPr lang="en-US" dirty="0" smtClean="0"/>
+              <a:t>Modular pattern</a:t>
+            </a:r>
+          </a:p>
+          <a:p>
+            <a:pPr marL="457200" indent="-457200" algn="l">
+              <a:buFont typeface="Arial"/>
+              <a:buChar char="•"/>
+            </a:pPr>
+            <a:r>
+              <a:rPr lang="en-US" dirty="0" smtClean="0"/>
+              <a:t>Use named functions</a:t>
+            </a:r>
+          </a:p>
+          <a:p>
+            <a:pPr marL="457200" indent="-457200" algn="l">
+              <a:buFont typeface="Arial"/>
+              <a:buChar char="•"/>
+            </a:pPr>
+            <a:r>
+              <a:rPr lang="en-US" dirty="0" smtClean="0"/>
+              <a:t>Easier to read/understand</a:t>
+            </a:r>
+          </a:p>
+          <a:p>
+            <a:pPr marL="457200" indent="-457200" algn="l">
+              <a:buFont typeface="Arial"/>
+              <a:buChar char="•"/>
+            </a:pPr>
+            <a:r>
+              <a:rPr lang="en-US" dirty="0" smtClean="0"/>
+              <a:t>Solves deep nesting problem</a:t>
+            </a:r>
+          </a:p>
+          <a:p>
+            <a:pPr marL="457200" indent="-457200" algn="l">
+              <a:buFont typeface="Arial"/>
+              <a:buChar char="•"/>
+            </a:pPr>
+            <a:r>
+              <a:rPr lang="en-US" dirty="0" smtClean="0"/>
+              <a:t>Still lots of repeated err handling</a:t>
+            </a:r>
+            <a:endParaRPr lang="en-US" dirty="0" smtClean="0"/>
+          </a:p>
+          <a:p>
+            <a:pPr algn="l"/>
+            <a:endParaRPr lang="en-US" dirty="0" smtClean="0"/>
+          </a:p>
+        </p:txBody>
+      </p:sp>
+    </p:spTree>
+    <p:extLst>
+      <p:ext uri="{BB962C8B-B14F-4D97-AF65-F5344CB8AC3E}">
+        <p14:creationId xmlns:p14="http://schemas.microsoft.com/office/powerpoint/2010/main" val="1742652516"/>
+      </p:ext>
+    </p:extLst>
+  </p:cSld>
+  <p:clrMapOvr>
+    <a:masterClrMapping/>
+  </p:clrMapOvr>
+</p:sld>
+</file>
+
+<file path=ppt/slides/slide27.xml><?xml version="1.0" encoding="utf-8"?>
+<p:sld xmlns:a="http://schemas.openxmlformats.org/drawingml/2006/main" xmlns:r="http://schemas.openxmlformats.org/officeDocument/2006/relationships" xmlns:p="http://schemas.openxmlformats.org/presentationml/2006/main">
+  <p:cSld>
+    <p:spTree>
+      <p:nvGrpSpPr>
+        <p:cNvPr id="1" name=""/>
+        <p:cNvGrpSpPr/>
+        <p:nvPr/>
+      </p:nvGrpSpPr>
+      <p:grpSpPr>
+        <a:xfrm>
+          <a:off x="0" y="0"/>
+          <a:ext cx="0" cy="0"/>
+          <a:chOff x="0" y="0"/>
+          <a:chExt cx="0" cy="0"/>
+        </a:xfrm>
+      </p:grpSpPr>
+      <p:sp>
+        <p:nvSpPr>
+          <p:cNvPr id="2" name="Title 1"/>
+          <p:cNvSpPr>
+            <a:spLocks noGrp="1"/>
+          </p:cNvSpPr>
+          <p:nvPr>
+            <p:ph type="ctrTitle"/>
+          </p:nvPr>
+        </p:nvSpPr>
+        <p:spPr>
+          <a:xfrm>
+            <a:off x="685800" y="160685"/>
+            <a:ext cx="7772400" cy="1470025"/>
+          </a:xfrm>
+        </p:spPr>
+        <p:txBody>
+          <a:bodyPr/>
+          <a:lstStyle/>
+          <a:p>
+            <a:pPr marL="457200" indent="-457200"/>
+            <a:r>
+              <a:rPr lang="en-US" dirty="0" err="1" smtClean="0"/>
+              <a:t>Async</a:t>
+            </a:r>
+            <a:r>
+              <a:rPr lang="en-US" dirty="0" smtClean="0"/>
+              <a:t> solutions</a:t>
+            </a:r>
+            <a:endParaRPr lang="en-US" dirty="0"/>
+          </a:p>
+        </p:txBody>
+      </p:sp>
+      <p:sp>
+        <p:nvSpPr>
+          <p:cNvPr id="3" name="Subtitle 2"/>
+          <p:cNvSpPr>
+            <a:spLocks noGrp="1"/>
+          </p:cNvSpPr>
+          <p:nvPr>
+            <p:ph type="subTitle" idx="1"/>
+          </p:nvPr>
+        </p:nvSpPr>
+        <p:spPr>
+          <a:xfrm>
+            <a:off x="1371600" y="1630710"/>
+            <a:ext cx="6400800" cy="4609893"/>
+          </a:xfrm>
+        </p:spPr>
+        <p:txBody>
+          <a:bodyPr>
+            <a:normAutofit/>
+          </a:bodyPr>
+          <a:lstStyle/>
+          <a:p>
+            <a:pPr algn="l"/>
+            <a:r>
+              <a:rPr lang="en-US" dirty="0" smtClean="0"/>
+              <a:t>Promises API</a:t>
+            </a:r>
+          </a:p>
+          <a:p>
+            <a:pPr marL="457200" indent="-457200" algn="l">
+              <a:buFont typeface="Arial"/>
+              <a:buChar char="•"/>
+            </a:pPr>
+            <a:r>
+              <a:rPr lang="en-US" dirty="0" smtClean="0"/>
+              <a:t>.then( success [, failure ] )</a:t>
+            </a:r>
+          </a:p>
+          <a:p>
+            <a:pPr marL="457200" indent="-457200" algn="l">
+              <a:buFont typeface="Arial"/>
+              <a:buChar char="•"/>
+            </a:pPr>
+            <a:r>
+              <a:rPr lang="en-US" dirty="0" smtClean="0"/>
+              <a:t>Easier to read/understand</a:t>
+            </a:r>
+          </a:p>
+          <a:p>
+            <a:pPr marL="457200" indent="-457200" algn="l">
+              <a:buFont typeface="Arial"/>
+              <a:buChar char="•"/>
+            </a:pPr>
+            <a:r>
+              <a:rPr lang="en-US" dirty="0" smtClean="0"/>
+              <a:t>Solves deep nesting problem</a:t>
+            </a:r>
+          </a:p>
+          <a:p>
+            <a:pPr marL="457200" indent="-457200" algn="l">
+              <a:buFont typeface="Arial"/>
+              <a:buChar char="•"/>
+            </a:pPr>
+            <a:r>
+              <a:rPr lang="en-US" dirty="0" smtClean="0"/>
+              <a:t>Solves err handling</a:t>
+            </a:r>
+            <a:endParaRPr lang="en-US" dirty="0" smtClean="0"/>
+          </a:p>
+          <a:p>
+            <a:pPr algn="l"/>
+            <a:endParaRPr lang="en-US" dirty="0" smtClean="0"/>
+          </a:p>
+        </p:txBody>
+      </p:sp>
+    </p:spTree>
+    <p:extLst>
+      <p:ext uri="{BB962C8B-B14F-4D97-AF65-F5344CB8AC3E}">
+        <p14:creationId xmlns:p14="http://schemas.microsoft.com/office/powerpoint/2010/main" val="1717841733"/>
+      </p:ext>
+    </p:extLst>
+  </p:cSld>
+  <p:clrMapOvr>
+    <a:masterClrMapping/>
+  </p:clrMapOvr>
+</p:sld>
+</file>
+
+<file path=ppt/slides/slide28.xml><?xml version="1.0" encoding="utf-8"?>
+<p:sld xmlns:a="http://schemas.openxmlformats.org/drawingml/2006/main" xmlns:r="http://schemas.openxmlformats.org/officeDocument/2006/relationships" xmlns:p="http://schemas.openxmlformats.org/presentationml/2006/main">
+  <p:cSld>
+    <p:spTree>
+      <p:nvGrpSpPr>
+        <p:cNvPr id="1" name=""/>
+        <p:cNvGrpSpPr/>
+        <p:nvPr/>
+      </p:nvGrpSpPr>
+      <p:grpSpPr>
+        <a:xfrm>
+          <a:off x="0" y="0"/>
+          <a:ext cx="0" cy="0"/>
+          <a:chOff x="0" y="0"/>
+          <a:chExt cx="0" cy="0"/>
+        </a:xfrm>
+      </p:grpSpPr>
+      <p:sp>
+        <p:nvSpPr>
+          <p:cNvPr id="2" name="Title 1"/>
+          <p:cNvSpPr>
+            <a:spLocks noGrp="1"/>
+          </p:cNvSpPr>
+          <p:nvPr>
+            <p:ph type="ctrTitle"/>
+          </p:nvPr>
+        </p:nvSpPr>
+        <p:spPr>
+          <a:xfrm>
+            <a:off x="685800" y="160685"/>
+            <a:ext cx="7772400" cy="1470025"/>
+          </a:xfrm>
+        </p:spPr>
+        <p:txBody>
+          <a:bodyPr/>
+          <a:lstStyle/>
+          <a:p>
+            <a:pPr marL="457200" indent="-457200"/>
+            <a:r>
+              <a:rPr lang="en-US" dirty="0" err="1" smtClean="0"/>
+              <a:t>Async</a:t>
+            </a:r>
+            <a:r>
+              <a:rPr lang="en-US" dirty="0" smtClean="0"/>
+              <a:t> solutions</a:t>
+            </a:r>
+            <a:endParaRPr lang="en-US" dirty="0"/>
+          </a:p>
+        </p:txBody>
+      </p:sp>
+      <p:sp>
+        <p:nvSpPr>
+          <p:cNvPr id="3" name="Subtitle 2"/>
+          <p:cNvSpPr>
+            <a:spLocks noGrp="1"/>
+          </p:cNvSpPr>
+          <p:nvPr>
+            <p:ph type="subTitle" idx="1"/>
+          </p:nvPr>
+        </p:nvSpPr>
+        <p:spPr>
+          <a:xfrm>
+            <a:off x="1371600" y="1630710"/>
+            <a:ext cx="6400800" cy="4609893"/>
+          </a:xfrm>
+        </p:spPr>
+        <p:txBody>
+          <a:bodyPr>
+            <a:normAutofit/>
+          </a:bodyPr>
+          <a:lstStyle/>
+          <a:p>
+            <a:pPr algn="l"/>
+            <a:r>
+              <a:rPr lang="en-US" dirty="0" smtClean="0"/>
+              <a:t>Promises API</a:t>
+            </a:r>
+          </a:p>
+          <a:p>
+            <a:pPr marL="457200" indent="-457200" algn="l">
+              <a:buFont typeface="Arial"/>
+              <a:buChar char="•"/>
+            </a:pPr>
+            <a:r>
+              <a:rPr lang="en-US" dirty="0" smtClean="0"/>
+              <a:t>Native in ES6</a:t>
+            </a:r>
+          </a:p>
+          <a:p>
+            <a:pPr marL="457200" indent="-457200" algn="l">
+              <a:buFont typeface="Arial"/>
+              <a:buChar char="•"/>
+            </a:pPr>
+            <a:r>
+              <a:rPr lang="en-US" dirty="0" smtClean="0"/>
+              <a:t>Use a library anyway</a:t>
+            </a:r>
+          </a:p>
+          <a:p>
+            <a:pPr marL="457200" indent="-457200" algn="l">
+              <a:buFont typeface="Arial"/>
+              <a:buChar char="•"/>
+            </a:pPr>
+            <a:r>
+              <a:rPr lang="en-US" dirty="0" smtClean="0"/>
+              <a:t>Native promises have a subtle memory leak</a:t>
+            </a:r>
+          </a:p>
+          <a:p>
+            <a:pPr marL="457200" indent="-457200" algn="l">
+              <a:buFont typeface="Arial"/>
+              <a:buChar char="•"/>
+            </a:pPr>
+            <a:r>
+              <a:rPr lang="en-US" dirty="0" smtClean="0"/>
+              <a:t>Plus library API is smaller</a:t>
+            </a:r>
+            <a:endParaRPr lang="en-US" dirty="0" smtClean="0"/>
+          </a:p>
+        </p:txBody>
+      </p:sp>
+    </p:spTree>
+    <p:extLst>
+      <p:ext uri="{BB962C8B-B14F-4D97-AF65-F5344CB8AC3E}">
+        <p14:creationId xmlns:p14="http://schemas.microsoft.com/office/powerpoint/2010/main" val="492988268"/>
+      </p:ext>
+    </p:extLst>
+  </p:cSld>
+  <p:clrMapOvr>
+    <a:masterClrMapping/>
+  </p:clrMapOvr>
+</p:sld>
+</file>
+
+<file path=ppt/slides/slide29.xml><?xml version="1.0" encoding="utf-8"?>
+<p:sld xmlns:a="http://schemas.openxmlformats.org/drawingml/2006/main" xmlns:r="http://schemas.openxmlformats.org/officeDocument/2006/relationships" xmlns:p="http://schemas.openxmlformats.org/presentationml/2006/main">
+  <p:cSld>
+    <p:spTree>
+      <p:nvGrpSpPr>
+        <p:cNvPr id="1" name=""/>
+        <p:cNvGrpSpPr/>
+        <p:nvPr/>
+      </p:nvGrpSpPr>
+      <p:grpSpPr>
+        <a:xfrm>
+          <a:off x="0" y="0"/>
+          <a:ext cx="0" cy="0"/>
+          <a:chOff x="0" y="0"/>
+          <a:chExt cx="0" cy="0"/>
+        </a:xfrm>
+      </p:grpSpPr>
+      <p:sp>
+        <p:nvSpPr>
+          <p:cNvPr id="2" name="Title 1"/>
+          <p:cNvSpPr>
+            <a:spLocks noGrp="1"/>
+          </p:cNvSpPr>
+          <p:nvPr>
+            <p:ph type="ctrTitle"/>
+          </p:nvPr>
+        </p:nvSpPr>
+        <p:spPr>
+          <a:xfrm>
+            <a:off x="685800" y="160685"/>
+            <a:ext cx="7772400" cy="1470025"/>
+          </a:xfrm>
+        </p:spPr>
+        <p:txBody>
+          <a:bodyPr/>
+          <a:lstStyle/>
+          <a:p>
+            <a:pPr marL="457200" indent="-457200"/>
+            <a:r>
+              <a:rPr lang="en-US" dirty="0" err="1" smtClean="0"/>
+              <a:t>Async</a:t>
+            </a:r>
+            <a:r>
+              <a:rPr lang="en-US" dirty="0" smtClean="0"/>
+              <a:t> solutions</a:t>
+            </a:r>
+            <a:endParaRPr lang="en-US" dirty="0"/>
+          </a:p>
+        </p:txBody>
+      </p:sp>
+      <p:sp>
+        <p:nvSpPr>
+          <p:cNvPr id="3" name="Subtitle 2"/>
+          <p:cNvSpPr>
+            <a:spLocks noGrp="1"/>
+          </p:cNvSpPr>
+          <p:nvPr>
+            <p:ph type="subTitle" idx="1"/>
+          </p:nvPr>
+        </p:nvSpPr>
+        <p:spPr>
+          <a:xfrm>
+            <a:off x="1371600" y="1630710"/>
+            <a:ext cx="6400800" cy="4609893"/>
+          </a:xfrm>
+        </p:spPr>
+        <p:txBody>
+          <a:bodyPr>
+            <a:normAutofit/>
+          </a:bodyPr>
+          <a:lstStyle/>
+          <a:p>
+            <a:pPr algn="l"/>
+            <a:r>
+              <a:rPr lang="en-US" dirty="0" err="1" smtClean="0"/>
+              <a:t>Async</a:t>
+            </a:r>
+            <a:r>
+              <a:rPr lang="en-US" dirty="0" smtClean="0"/>
+              <a:t> library</a:t>
+            </a:r>
+          </a:p>
+          <a:p>
+            <a:pPr marL="457200" indent="-457200" algn="l">
+              <a:buFont typeface="Arial"/>
+              <a:buChar char="•"/>
+            </a:pPr>
+            <a:r>
+              <a:rPr lang="en-US" dirty="0" smtClean="0"/>
+              <a:t>Control flow collections</a:t>
+            </a:r>
+          </a:p>
+          <a:p>
+            <a:pPr marL="914400" lvl="1" indent="-457200" algn="l">
+              <a:buFont typeface="Arial"/>
+              <a:buChar char="•"/>
+            </a:pPr>
+            <a:r>
+              <a:rPr lang="en-US" dirty="0" smtClean="0"/>
+              <a:t>.series </a:t>
+            </a:r>
+          </a:p>
+          <a:p>
+            <a:pPr marL="914400" lvl="1" indent="-457200" algn="l">
+              <a:buFont typeface="Arial"/>
+              <a:buChar char="•"/>
+            </a:pPr>
+            <a:r>
+              <a:rPr lang="en-US" dirty="0" smtClean="0"/>
+              <a:t>.parallel</a:t>
+            </a:r>
+          </a:p>
+          <a:p>
+            <a:pPr marL="914400" lvl="1" indent="-457200" algn="l">
+              <a:buFont typeface="Arial"/>
+              <a:buChar char="•"/>
+            </a:pPr>
+            <a:r>
+              <a:rPr lang="en-US" dirty="0" smtClean="0"/>
+              <a:t>.waterfall ( series + passes results)</a:t>
+            </a:r>
+          </a:p>
+          <a:p>
+            <a:pPr marL="914400" lvl="1" indent="-457200" algn="l">
+              <a:buFont typeface="Arial"/>
+              <a:buChar char="•"/>
+            </a:pPr>
+            <a:r>
+              <a:rPr lang="en-US" dirty="0" smtClean="0"/>
+              <a:t>.until</a:t>
+            </a:r>
+          </a:p>
+          <a:p>
+            <a:pPr marL="457200" indent="-457200" algn="l">
+              <a:buFont typeface="Arial"/>
+              <a:buChar char="•"/>
+            </a:pPr>
+            <a:r>
+              <a:rPr lang="en-US" dirty="0" smtClean="0"/>
+              <a:t>Bonus</a:t>
+            </a:r>
+            <a:r>
+              <a:rPr lang="en-US" dirty="0"/>
+              <a:t>:  map/</a:t>
+            </a:r>
+            <a:r>
+              <a:rPr lang="en-US" dirty="0" smtClean="0"/>
+              <a:t>reduce helpers</a:t>
+            </a:r>
+          </a:p>
+        </p:txBody>
+      </p:sp>
+    </p:spTree>
+    <p:extLst>
+      <p:ext uri="{BB962C8B-B14F-4D97-AF65-F5344CB8AC3E}">
+        <p14:creationId xmlns:p14="http://schemas.microsoft.com/office/powerpoint/2010/main" val="553375906"/>
       </p:ext>
     </p:extLst>
   </p:cSld>
@@ -5614,7 +6544,6 @@
               <a:rPr lang="en-US" dirty="0"/>
               <a:t>Events</a:t>
             </a:r>
-            <a:endParaRPr lang="en-US" dirty="0"/>
           </a:p>
         </p:txBody>
       </p:sp>
@@ -5747,7 +6676,6 @@
               <a:rPr lang="en-US" dirty="0"/>
               <a:t>Events</a:t>
             </a:r>
-            <a:endParaRPr lang="en-US" dirty="0"/>
           </a:p>
         </p:txBody>
       </p:sp>
@@ -5881,7 +6809,6 @@
               <a:rPr lang="en-US" dirty="0"/>
               <a:t>Events</a:t>
             </a:r>
-            <a:endParaRPr lang="en-US" dirty="0"/>
           </a:p>
         </p:txBody>
       </p:sp>
@@ -6039,7 +6966,6 @@
               <a:rPr lang="en-US" dirty="0"/>
               <a:t>Events</a:t>
             </a:r>
-            <a:endParaRPr lang="en-US" dirty="0"/>
           </a:p>
         </p:txBody>
       </p:sp>
@@ -6185,7 +7111,6 @@
               <a:rPr lang="en-US" dirty="0"/>
               <a:t>Events</a:t>
             </a:r>
-            <a:endParaRPr lang="en-US" dirty="0"/>
           </a:p>
         </p:txBody>
       </p:sp>
@@ -6369,7 +7294,6 @@
               <a:rPr lang="en-US" dirty="0"/>
               <a:t>Events</a:t>
             </a:r>
-            <a:endParaRPr lang="en-US" dirty="0"/>
           </a:p>
         </p:txBody>
       </p:sp>
@@ -6539,7 +7463,7 @@
         </p:spPr>
         <p:txBody>
           <a:bodyPr>
-            <a:normAutofit fontScale="70000" lnSpcReduction="20000"/>
+            <a:normAutofit fontScale="77500" lnSpcReduction="20000"/>
           </a:bodyPr>
           <a:lstStyle/>
           <a:p>
@@ -6642,23 +7566,6 @@
             <a:r>
               <a:rPr lang="en-US" dirty="0" smtClean="0"/>
               <a:t>Leave if they don't hear enough music they like</a:t>
-            </a:r>
-          </a:p>
-          <a:p>
-            <a:pPr algn="l"/>
-            <a:r>
-              <a:rPr lang="en-US" dirty="0" smtClean="0"/>
-              <a:t>Advertisers</a:t>
-            </a:r>
-          </a:p>
-          <a:p>
-            <a:pPr marL="457200" indent="-457200" algn="l">
-              <a:buFont typeface="Arial"/>
-              <a:buChar char="•"/>
-            </a:pPr>
-            <a:r>
-              <a:rPr lang="en-US" dirty="0" smtClean="0"/>
-              <a:t>Pay based on # fans x # plays</a:t>
             </a:r>
           </a:p>
           <a:p>

</xml_diff>